<commit_message>
ajustes para aula inicial
</commit_message>
<xml_diff>
--- a/_DOCUMENTOS/Treinamento Pynton.pptx
+++ b/_DOCUMENTOS/Treinamento Pynton.pptx
@@ -14,21 +14,21 @@
     <p:sldId id="259" r:id="rId5"/>
     <p:sldId id="260" r:id="rId6"/>
     <p:sldId id="261" r:id="rId7"/>
-    <p:sldId id="262" r:id="rId8"/>
-    <p:sldId id="263" r:id="rId9"/>
-    <p:sldId id="264" r:id="rId10"/>
+    <p:sldId id="264" r:id="rId8"/>
+    <p:sldId id="262" r:id="rId9"/>
+    <p:sldId id="263" r:id="rId10"/>
     <p:sldId id="265" r:id="rId11"/>
   </p:sldIdLst>
   <p:sldSz cx="9144000" cy="5143500" type="screen16x9"/>
   <p:notesSz cx="6858000" cy="9144000"/>
   <p:embeddedFontLst>
     <p:embeddedFont>
-      <p:font typeface="Comfortaa" panose="020B0604020202020204" charset="0"/>
+      <p:font typeface="Comfortaa Regular" panose="020B0604020202020204" charset="0"/>
       <p:regular r:id="rId13"/>
       <p:bold r:id="rId14"/>
     </p:embeddedFont>
     <p:embeddedFont>
-      <p:font typeface="Comfortaa Regular" panose="020B0604020202020204" charset="0"/>
+      <p:font typeface="Comfortaa" panose="020B0604020202020204" charset="0"/>
       <p:regular r:id="rId15"/>
       <p:bold r:id="rId16"/>
     </p:embeddedFont>
@@ -1495,6 +1495,115 @@
   <p:cSld>
     <p:spTree>
       <p:nvGrpSpPr>
+        <p:cNvPr id="1" name="Shape 170"/>
+        <p:cNvGrpSpPr/>
+        <p:nvPr/>
+      </p:nvGrpSpPr>
+      <p:grpSpPr>
+        <a:xfrm>
+          <a:off x="0" y="0"/>
+          <a:ext cx="0" cy="0"/>
+          <a:chOff x="0" y="0"/>
+          <a:chExt cx="0" cy="0"/>
+        </a:xfrm>
+      </p:grpSpPr>
+      <p:sp>
+        <p:nvSpPr>
+          <p:cNvPr id="171" name="Google Shape;171;g94f9cbe481_0_32:notes"/>
+          <p:cNvSpPr>
+            <a:spLocks noGrp="1" noRot="1" noChangeAspect="1"/>
+          </p:cNvSpPr>
+          <p:nvPr>
+            <p:ph type="sldImg" idx="2"/>
+          </p:nvPr>
+        </p:nvSpPr>
+        <p:spPr>
+          <a:xfrm>
+            <a:off x="381000" y="685800"/>
+            <a:ext cx="6096000" cy="3429000"/>
+          </a:xfrm>
+          <a:custGeom>
+            <a:avLst/>
+            <a:gdLst/>
+            <a:ahLst/>
+            <a:cxnLst/>
+            <a:rect l="l" t="t" r="r" b="b"/>
+            <a:pathLst>
+              <a:path w="120000" h="120000" extrusionOk="0">
+                <a:moveTo>
+                  <a:pt x="0" y="0"/>
+                </a:moveTo>
+                <a:lnTo>
+                  <a:pt x="120000" y="0"/>
+                </a:lnTo>
+                <a:lnTo>
+                  <a:pt x="120000" y="120000"/>
+                </a:lnTo>
+                <a:lnTo>
+                  <a:pt x="0" y="120000"/>
+                </a:lnTo>
+                <a:close/>
+              </a:path>
+            </a:pathLst>
+          </a:custGeom>
+        </p:spPr>
+      </p:sp>
+      <p:sp>
+        <p:nvSpPr>
+          <p:cNvPr id="172" name="Google Shape;172;g94f9cbe481_0_32:notes"/>
+          <p:cNvSpPr txBox="1">
+            <a:spLocks noGrp="1"/>
+          </p:cNvSpPr>
+          <p:nvPr>
+            <p:ph type="body" idx="1"/>
+          </p:nvPr>
+        </p:nvSpPr>
+        <p:spPr>
+          <a:xfrm>
+            <a:off x="685800" y="4343400"/>
+            <a:ext cx="5486400" cy="4114800"/>
+          </a:xfrm>
+          <a:prstGeom prst="rect">
+            <a:avLst/>
+          </a:prstGeom>
+        </p:spPr>
+        <p:txBody>
+          <a:bodyPr spcFirstLastPara="1" wrap="square" lIns="91425" tIns="91425" rIns="91425" bIns="91425" anchor="t" anchorCtr="0">
+            <a:noAutofit/>
+          </a:bodyPr>
+          <a:lstStyle/>
+          <a:p>
+            <a:pPr marL="0" lvl="0" indent="0" algn="l" rtl="0">
+              <a:spcBef>
+                <a:spcPts val="0"/>
+              </a:spcBef>
+              <a:spcAft>
+                <a:spcPts val="0"/>
+              </a:spcAft>
+              <a:buNone/>
+            </a:pPr>
+            <a:endParaRPr/>
+          </a:p>
+        </p:txBody>
+      </p:sp>
+    </p:spTree>
+    <p:extLst>
+      <p:ext uri="{BB962C8B-B14F-4D97-AF65-F5344CB8AC3E}">
+        <p14:creationId xmlns:p14="http://schemas.microsoft.com/office/powerpoint/2010/main" val="1230276840"/>
+      </p:ext>
+    </p:extLst>
+  </p:cSld>
+  <p:clrMapOvr>
+    <a:masterClrMapping/>
+  </p:clrMapOvr>
+</p:notes>
+</file>
+
+<file path=ppt/notesSlides/notesSlide8.xml><?xml version="1.0" encoding="utf-8"?>
+<p:notes xmlns:a="http://schemas.openxmlformats.org/drawingml/2006/main" xmlns:r="http://schemas.openxmlformats.org/officeDocument/2006/relationships" xmlns:p="http://schemas.openxmlformats.org/presentationml/2006/main" showMasterSp="0" showMasterPhAnim="0">
+  <p:cSld>
+    <p:spTree>
+      <p:nvGrpSpPr>
         <p:cNvPr id="1" name="Shape 149"/>
         <p:cNvGrpSpPr/>
         <p:nvPr/>
@@ -1599,7 +1708,7 @@
 </p:notes>
 </file>
 
-<file path=ppt/notesSlides/notesSlide8.xml><?xml version="1.0" encoding="utf-8"?>
+<file path=ppt/notesSlides/notesSlide9.xml><?xml version="1.0" encoding="utf-8"?>
 <p:notes xmlns:a="http://schemas.openxmlformats.org/drawingml/2006/main" xmlns:r="http://schemas.openxmlformats.org/officeDocument/2006/relationships" xmlns:p="http://schemas.openxmlformats.org/presentationml/2006/main" showMasterSp="0" showMasterPhAnim="0">
   <p:cSld>
     <p:spTree>
@@ -1699,115 +1808,6 @@
     <p:extLst>
       <p:ext uri="{BB962C8B-B14F-4D97-AF65-F5344CB8AC3E}">
         <p14:creationId xmlns:p14="http://schemas.microsoft.com/office/powerpoint/2010/main" val="890453401"/>
-      </p:ext>
-    </p:extLst>
-  </p:cSld>
-  <p:clrMapOvr>
-    <a:masterClrMapping/>
-  </p:clrMapOvr>
-</p:notes>
-</file>
-
-<file path=ppt/notesSlides/notesSlide9.xml><?xml version="1.0" encoding="utf-8"?>
-<p:notes xmlns:a="http://schemas.openxmlformats.org/drawingml/2006/main" xmlns:r="http://schemas.openxmlformats.org/officeDocument/2006/relationships" xmlns:p="http://schemas.openxmlformats.org/presentationml/2006/main" showMasterSp="0" showMasterPhAnim="0">
-  <p:cSld>
-    <p:spTree>
-      <p:nvGrpSpPr>
-        <p:cNvPr id="1" name="Shape 170"/>
-        <p:cNvGrpSpPr/>
-        <p:nvPr/>
-      </p:nvGrpSpPr>
-      <p:grpSpPr>
-        <a:xfrm>
-          <a:off x="0" y="0"/>
-          <a:ext cx="0" cy="0"/>
-          <a:chOff x="0" y="0"/>
-          <a:chExt cx="0" cy="0"/>
-        </a:xfrm>
-      </p:grpSpPr>
-      <p:sp>
-        <p:nvSpPr>
-          <p:cNvPr id="171" name="Google Shape;171;g94f9cbe481_0_32:notes"/>
-          <p:cNvSpPr>
-            <a:spLocks noGrp="1" noRot="1" noChangeAspect="1"/>
-          </p:cNvSpPr>
-          <p:nvPr>
-            <p:ph type="sldImg" idx="2"/>
-          </p:nvPr>
-        </p:nvSpPr>
-        <p:spPr>
-          <a:xfrm>
-            <a:off x="381000" y="685800"/>
-            <a:ext cx="6096000" cy="3429000"/>
-          </a:xfrm>
-          <a:custGeom>
-            <a:avLst/>
-            <a:gdLst/>
-            <a:ahLst/>
-            <a:cxnLst/>
-            <a:rect l="l" t="t" r="r" b="b"/>
-            <a:pathLst>
-              <a:path w="120000" h="120000" extrusionOk="0">
-                <a:moveTo>
-                  <a:pt x="0" y="0"/>
-                </a:moveTo>
-                <a:lnTo>
-                  <a:pt x="120000" y="0"/>
-                </a:lnTo>
-                <a:lnTo>
-                  <a:pt x="120000" y="120000"/>
-                </a:lnTo>
-                <a:lnTo>
-                  <a:pt x="0" y="120000"/>
-                </a:lnTo>
-                <a:close/>
-              </a:path>
-            </a:pathLst>
-          </a:custGeom>
-        </p:spPr>
-      </p:sp>
-      <p:sp>
-        <p:nvSpPr>
-          <p:cNvPr id="172" name="Google Shape;172;g94f9cbe481_0_32:notes"/>
-          <p:cNvSpPr txBox="1">
-            <a:spLocks noGrp="1"/>
-          </p:cNvSpPr>
-          <p:nvPr>
-            <p:ph type="body" idx="1"/>
-          </p:nvPr>
-        </p:nvSpPr>
-        <p:spPr>
-          <a:xfrm>
-            <a:off x="685800" y="4343400"/>
-            <a:ext cx="5486400" cy="4114800"/>
-          </a:xfrm>
-          <a:prstGeom prst="rect">
-            <a:avLst/>
-          </a:prstGeom>
-        </p:spPr>
-        <p:txBody>
-          <a:bodyPr spcFirstLastPara="1" wrap="square" lIns="91425" tIns="91425" rIns="91425" bIns="91425" anchor="t" anchorCtr="0">
-            <a:noAutofit/>
-          </a:bodyPr>
-          <a:lstStyle/>
-          <a:p>
-            <a:pPr marL="0" lvl="0" indent="0" algn="l" rtl="0">
-              <a:spcBef>
-                <a:spcPts val="0"/>
-              </a:spcBef>
-              <a:spcAft>
-                <a:spcPts val="0"/>
-              </a:spcAft>
-              <a:buNone/>
-            </a:pPr>
-            <a:endParaRPr/>
-          </a:p>
-        </p:txBody>
-      </p:sp>
-    </p:spTree>
-    <p:extLst>
-      <p:ext uri="{BB962C8B-B14F-4D97-AF65-F5344CB8AC3E}">
-        <p14:creationId xmlns:p14="http://schemas.microsoft.com/office/powerpoint/2010/main" val="1230276840"/>
       </p:ext>
     </p:extLst>
   </p:cSld>
@@ -7087,7 +7087,7 @@
         </p:nvSpPr>
         <p:spPr>
           <a:xfrm>
-            <a:off x="0" y="0"/>
+            <a:off x="64175" y="47046"/>
             <a:ext cx="9175200" cy="5143500"/>
           </a:xfrm>
           <a:prstGeom prst="rect">
@@ -7157,8 +7157,8 @@
         </p:nvSpPr>
         <p:spPr>
           <a:xfrm>
-            <a:off x="5355300" y="2836475"/>
-            <a:ext cx="3544500" cy="1633800"/>
+            <a:off x="5355300" y="2564235"/>
+            <a:ext cx="3544500" cy="1906039"/>
           </a:xfrm>
           <a:prstGeom prst="rect">
             <a:avLst/>
@@ -7187,7 +7187,7 @@
               <a:buNone/>
             </a:pPr>
             <a:r>
-              <a:rPr lang="en" i="1">
+              <a:rPr lang="en" i="1" dirty="0">
                 <a:solidFill>
                   <a:srgbClr val="FFFFFF"/>
                 </a:solidFill>
@@ -7198,7 +7198,7 @@
               </a:rPr>
               <a:t>"Bonito é melhor que feio.</a:t>
             </a:r>
-            <a:endParaRPr i="1">
+            <a:endParaRPr i="1" dirty="0">
               <a:solidFill>
                 <a:srgbClr val="FFFFFF"/>
               </a:solidFill>
@@ -7222,7 +7222,7 @@
               <a:buNone/>
             </a:pPr>
             <a:r>
-              <a:rPr lang="en" i="1">
+              <a:rPr lang="en" i="1" dirty="0">
                 <a:solidFill>
                   <a:srgbClr val="FFFFFF"/>
                 </a:solidFill>
@@ -7233,7 +7233,7 @@
               </a:rPr>
               <a:t>Explícito é melhor que implícito.</a:t>
             </a:r>
-            <a:endParaRPr i="1">
+            <a:endParaRPr i="1" dirty="0">
               <a:solidFill>
                 <a:srgbClr val="FFFFFF"/>
               </a:solidFill>
@@ -7257,7 +7257,7 @@
               <a:buNone/>
             </a:pPr>
             <a:r>
-              <a:rPr lang="en" i="1">
+              <a:rPr lang="en" i="1" dirty="0">
                 <a:solidFill>
                   <a:srgbClr val="FFFFFF"/>
                 </a:solidFill>
@@ -7268,7 +7268,7 @@
               </a:rPr>
               <a:t>Simples é melhor que complexo.</a:t>
             </a:r>
-            <a:endParaRPr i="1">
+            <a:endParaRPr i="1" dirty="0">
               <a:solidFill>
                 <a:srgbClr val="FFFFFF"/>
               </a:solidFill>
@@ -7292,7 +7292,7 @@
               <a:buNone/>
             </a:pPr>
             <a:r>
-              <a:rPr lang="en" i="1">
+              <a:rPr lang="en" i="1" dirty="0">
                 <a:solidFill>
                   <a:srgbClr val="FFFFFF"/>
                 </a:solidFill>
@@ -7303,7 +7303,7 @@
               </a:rPr>
               <a:t>Complexo é melhor que complicado.</a:t>
             </a:r>
-            <a:endParaRPr i="1">
+            <a:endParaRPr i="1" dirty="0">
               <a:solidFill>
                 <a:srgbClr val="FFFFFF"/>
               </a:solidFill>
@@ -7327,7 +7327,7 @@
               <a:buNone/>
             </a:pPr>
             <a:r>
-              <a:rPr lang="en" i="1">
+              <a:rPr lang="en" i="1" dirty="0">
                 <a:solidFill>
                   <a:srgbClr val="FFFFFF"/>
                 </a:solidFill>
@@ -7338,7 +7338,7 @@
               </a:rPr>
               <a:t>Linear é melhor do que aninhado.</a:t>
             </a:r>
-            <a:endParaRPr i="1">
+            <a:endParaRPr i="1" dirty="0">
               <a:solidFill>
                 <a:srgbClr val="FFFFFF"/>
               </a:solidFill>
@@ -7362,7 +7362,7 @@
               <a:buNone/>
             </a:pPr>
             <a:r>
-              <a:rPr lang="en" i="1">
+              <a:rPr lang="en" i="1" dirty="0">
                 <a:solidFill>
                   <a:srgbClr val="FFFFFF"/>
                 </a:solidFill>
@@ -7373,7 +7373,7 @@
               </a:rPr>
               <a:t>Esparso é melhor que denso."</a:t>
             </a:r>
-            <a:endParaRPr i="1">
+            <a:endParaRPr i="1" dirty="0">
               <a:solidFill>
                 <a:srgbClr val="FFFFFF"/>
               </a:solidFill>
@@ -7393,8 +7393,8 @@
         </p:nvSpPr>
         <p:spPr>
           <a:xfrm>
-            <a:off x="313475" y="3259775"/>
-            <a:ext cx="4338300" cy="1065000"/>
+            <a:off x="313475" y="3080875"/>
+            <a:ext cx="4338300" cy="1626600"/>
           </a:xfrm>
           <a:prstGeom prst="rect">
             <a:avLst/>
@@ -7420,7 +7420,7 @@
               <a:buNone/>
             </a:pPr>
             <a:r>
-              <a:rPr lang="en" sz="5200" b="1">
+              <a:rPr lang="pt-BR" sz="5200" b="1" dirty="0" smtClean="0">
                 <a:solidFill>
                   <a:schemeClr val="lt1"/>
                 </a:solidFill>
@@ -7429,9 +7429,9 @@
                 <a:cs typeface="Comfortaa"/>
                 <a:sym typeface="Comfortaa"/>
               </a:rPr>
-              <a:t>Obrigada!</a:t>
+              <a:t>Hora da aula!</a:t>
             </a:r>
-            <a:endParaRPr sz="5200" b="1">
+            <a:endParaRPr sz="5200" b="1" dirty="0">
               <a:solidFill>
                 <a:schemeClr val="lt1"/>
               </a:solidFill>
@@ -7439,79 +7439,6 @@
               <a:ea typeface="Comfortaa"/>
               <a:cs typeface="Comfortaa"/>
               <a:sym typeface="Comfortaa"/>
-            </a:endParaRPr>
-          </a:p>
-        </p:txBody>
-      </p:sp>
-      <p:sp>
-        <p:nvSpPr>
-          <p:cNvPr id="194" name="Google Shape;194;p22"/>
-          <p:cNvSpPr txBox="1"/>
-          <p:nvPr/>
-        </p:nvSpPr>
-        <p:spPr>
-          <a:xfrm>
-            <a:off x="518825" y="4048250"/>
-            <a:ext cx="2695800" cy="754800"/>
-          </a:xfrm>
-          <a:prstGeom prst="rect">
-            <a:avLst/>
-          </a:prstGeom>
-          <a:noFill/>
-          <a:ln>
-            <a:noFill/>
-          </a:ln>
-        </p:spPr>
-        <p:txBody>
-          <a:bodyPr spcFirstLastPara="1" wrap="square" lIns="91425" tIns="91425" rIns="91425" bIns="91425" anchor="t" anchorCtr="0">
-            <a:noAutofit/>
-          </a:bodyPr>
-          <a:lstStyle/>
-          <a:p>
-            <a:pPr marL="0" lvl="0" indent="0" algn="l" rtl="0">
-              <a:lnSpc>
-                <a:spcPct val="150000"/>
-              </a:lnSpc>
-              <a:spcBef>
-                <a:spcPts val="0"/>
-              </a:spcBef>
-              <a:spcAft>
-                <a:spcPts val="0"/>
-              </a:spcAft>
-              <a:buNone/>
-            </a:pPr>
-            <a:r>
-              <a:rPr lang="en" sz="1600">
-                <a:solidFill>
-                  <a:schemeClr val="lt1"/>
-                </a:solidFill>
-                <a:latin typeface="Comfortaa Regular"/>
-                <a:ea typeface="Comfortaa Regular"/>
-                <a:cs typeface="Comfortaa Regular"/>
-                <a:sym typeface="Comfortaa Regular"/>
-              </a:rPr>
-              <a:t>Até a próxima aula</a:t>
-            </a:r>
-            <a:r>
-              <a:rPr lang="en" sz="2000">
-                <a:solidFill>
-                  <a:schemeClr val="lt1"/>
-                </a:solidFill>
-                <a:latin typeface="Comfortaa Regular"/>
-                <a:ea typeface="Comfortaa Regular"/>
-                <a:cs typeface="Comfortaa Regular"/>
-                <a:sym typeface="Comfortaa Regular"/>
-              </a:rPr>
-              <a:t> </a:t>
-            </a:r>
-            <a:endParaRPr sz="2000">
-              <a:solidFill>
-                <a:schemeClr val="lt1"/>
-              </a:solidFill>
-              <a:latin typeface="Comfortaa Regular"/>
-              <a:ea typeface="Comfortaa Regular"/>
-              <a:cs typeface="Comfortaa Regular"/>
-              <a:sym typeface="Comfortaa Regular"/>
             </a:endParaRPr>
           </a:p>
         </p:txBody>
@@ -9762,7 +9689,7 @@
               <a:buAutoNum type="arabicPeriod"/>
             </a:pPr>
             <a:r>
-              <a:rPr lang="en" sz="1000" b="1">
+              <a:rPr lang="en" sz="1000" b="1" dirty="0">
                 <a:solidFill>
                   <a:schemeClr val="dk1"/>
                 </a:solidFill>
@@ -9773,7 +9700,7 @@
               </a:rPr>
               <a:t>Declaração de variável</a:t>
             </a:r>
-            <a:endParaRPr sz="1000" b="1">
+            <a:endParaRPr sz="1000" b="1" dirty="0">
               <a:solidFill>
                 <a:schemeClr val="dk1"/>
               </a:solidFill>
@@ -9802,7 +9729,7 @@
               <a:buAutoNum type="arabicPeriod"/>
             </a:pPr>
             <a:r>
-              <a:rPr lang="en" sz="1000" b="1">
+              <a:rPr lang="en" sz="1000" b="1" dirty="0">
                 <a:solidFill>
                   <a:schemeClr val="dk1"/>
                 </a:solidFill>
@@ -9813,7 +9740,7 @@
               </a:rPr>
               <a:t>Tipos de variáveis</a:t>
             </a:r>
-            <a:endParaRPr sz="1000" b="1">
+            <a:endParaRPr sz="1000" b="1" dirty="0">
               <a:solidFill>
                 <a:schemeClr val="dk1"/>
               </a:solidFill>
@@ -9842,7 +9769,7 @@
               <a:buAutoNum type="arabicPeriod"/>
             </a:pPr>
             <a:r>
-              <a:rPr lang="en" sz="1000" b="1">
+              <a:rPr lang="en" sz="1000" b="1" dirty="0">
                 <a:solidFill>
                   <a:schemeClr val="dk1"/>
                 </a:solidFill>
@@ -9853,7 +9780,7 @@
               </a:rPr>
               <a:t>Vetor x Lista</a:t>
             </a:r>
-            <a:endParaRPr sz="1000" b="1">
+            <a:endParaRPr sz="1000" b="1" dirty="0">
               <a:solidFill>
                 <a:schemeClr val="dk1"/>
               </a:solidFill>
@@ -9882,7 +9809,7 @@
               <a:buAutoNum type="arabicPeriod"/>
             </a:pPr>
             <a:r>
-              <a:rPr lang="en" sz="1000" b="1">
+              <a:rPr lang="en" sz="1000" b="1" dirty="0">
                 <a:solidFill>
                   <a:schemeClr val="dk1"/>
                 </a:solidFill>
@@ -9891,9 +9818,52 @@
                 <a:cs typeface="Comfortaa"/>
                 <a:sym typeface="Comfortaa"/>
               </a:rPr>
-              <a:t>IF ELSE</a:t>
+              <a:t>IF </a:t>
             </a:r>
-            <a:endParaRPr sz="1000" b="1">
+            <a:r>
+              <a:rPr lang="en" sz="1000" b="1" dirty="0" smtClean="0">
+                <a:solidFill>
+                  <a:schemeClr val="dk1"/>
+                </a:solidFill>
+                <a:latin typeface="Comfortaa"/>
+                <a:ea typeface="Comfortaa"/>
+                <a:cs typeface="Comfortaa"/>
+                <a:sym typeface="Comfortaa"/>
+              </a:rPr>
+              <a:t>ELSE</a:t>
+            </a:r>
+          </a:p>
+          <a:p>
+            <a:pPr marL="457200" lvl="0" indent="-292100" algn="l" rtl="0">
+              <a:lnSpc>
+                <a:spcPct val="200000"/>
+              </a:lnSpc>
+              <a:spcBef>
+                <a:spcPts val="0"/>
+              </a:spcBef>
+              <a:spcAft>
+                <a:spcPts val="0"/>
+              </a:spcAft>
+              <a:buClr>
+                <a:schemeClr val="dk1"/>
+              </a:buClr>
+              <a:buSzPts val="1000"/>
+              <a:buFont typeface="Comfortaa"/>
+              <a:buAutoNum type="arabicPeriod"/>
+            </a:pPr>
+            <a:r>
+              <a:rPr lang="en" sz="1000" b="1" dirty="0" smtClean="0">
+                <a:solidFill>
+                  <a:schemeClr val="dk1"/>
+                </a:solidFill>
+                <a:latin typeface="Comfortaa"/>
+                <a:ea typeface="Comfortaa"/>
+                <a:cs typeface="Comfortaa"/>
+                <a:sym typeface="Comfortaa"/>
+              </a:rPr>
+              <a:t>Laços (For e While)</a:t>
+            </a:r>
+            <a:endParaRPr sz="1000" b="1" dirty="0">
               <a:solidFill>
                 <a:schemeClr val="dk1"/>
               </a:solidFill>
@@ -9916,7 +9886,7 @@
               </a:spcAft>
               <a:buNone/>
             </a:pPr>
-            <a:endParaRPr sz="1000">
+            <a:endParaRPr sz="1000" dirty="0">
               <a:solidFill>
                 <a:schemeClr val="dk1"/>
               </a:solidFill>
@@ -9940,7 +9910,7 @@
               <a:buNone/>
             </a:pPr>
             <a:r>
-              <a:rPr lang="en" sz="1000">
+              <a:rPr lang="en" sz="1000" dirty="0">
                 <a:solidFill>
                   <a:schemeClr val="dk1"/>
                 </a:solidFill>
@@ -9951,7 +9921,7 @@
               </a:rPr>
               <a:t>        </a:t>
             </a:r>
-            <a:endParaRPr sz="1000"/>
+            <a:endParaRPr sz="1000" dirty="0"/>
           </a:p>
         </p:txBody>
       </p:sp>
@@ -10021,8 +9991,8 @@
         </p:nvSpPr>
         <p:spPr>
           <a:xfrm>
-            <a:off x="6454300" y="842250"/>
-            <a:ext cx="1813200" cy="814200"/>
+            <a:off x="6454299" y="842250"/>
+            <a:ext cx="2020151" cy="814200"/>
           </a:xfrm>
           <a:prstGeom prst="rect">
             <a:avLst/>
@@ -10056,7 +10026,7 @@
               <a:buAutoNum type="arabicPeriod"/>
             </a:pPr>
             <a:r>
-              <a:rPr lang="en" sz="1000" b="1">
+              <a:rPr lang="pt-BR" sz="1000" b="1" dirty="0" smtClean="0">
                 <a:solidFill>
                   <a:schemeClr val="dk1"/>
                 </a:solidFill>
@@ -10065,20 +10035,11 @@
                 <a:cs typeface="Comfortaa"/>
                 <a:sym typeface="Comfortaa"/>
               </a:rPr>
-              <a:t>Dicionário </a:t>
+              <a:t>Funções</a:t>
             </a:r>
-            <a:endParaRPr sz="1000" b="1">
-              <a:solidFill>
-                <a:schemeClr val="dk1"/>
-              </a:solidFill>
-              <a:latin typeface="Comfortaa"/>
-              <a:ea typeface="Comfortaa"/>
-              <a:cs typeface="Comfortaa"/>
-              <a:sym typeface="Comfortaa"/>
-            </a:endParaRPr>
-          </a:p>
-          <a:p>
-            <a:pPr marL="457200" lvl="0" indent="0" algn="l" rtl="0">
+          </a:p>
+          <a:p>
+            <a:pPr marL="457200" lvl="0" indent="-292100" algn="l" rtl="0">
               <a:lnSpc>
                 <a:spcPct val="200000"/>
               </a:lnSpc>
@@ -10088,21 +10049,26 @@
               <a:spcAft>
                 <a:spcPts val="0"/>
               </a:spcAft>
-              <a:buNone/>
+              <a:buClr>
+                <a:schemeClr val="dk1"/>
+              </a:buClr>
+              <a:buSzPts val="1000"/>
+              <a:buFont typeface="Comfortaa"/>
+              <a:buAutoNum type="arabicPeriod"/>
             </a:pPr>
             <a:r>
-              <a:rPr lang="en" sz="1000">
+              <a:rPr lang="pt-BR" sz="1000" b="1" dirty="0" smtClean="0">
                 <a:solidFill>
                   <a:schemeClr val="dk1"/>
                 </a:solidFill>
-                <a:latin typeface="Comfortaa Regular"/>
-                <a:ea typeface="Comfortaa Regular"/>
-                <a:cs typeface="Comfortaa Regular"/>
-                <a:sym typeface="Comfortaa Regular"/>
+                <a:latin typeface="Comfortaa"/>
+                <a:ea typeface="Comfortaa"/>
+                <a:cs typeface="Comfortaa"/>
+                <a:sym typeface="Comfortaa"/>
               </a:rPr>
-              <a:t>(Não se engane)</a:t>
+              <a:t>Reciclando funções</a:t>
             </a:r>
-            <a:endParaRPr sz="1000">
+            <a:endParaRPr sz="1000" dirty="0">
               <a:solidFill>
                 <a:schemeClr val="dk1"/>
               </a:solidFill>
@@ -10122,7 +10088,7 @@
         </p:nvSpPr>
         <p:spPr>
           <a:xfrm>
-            <a:off x="6523500" y="2500100"/>
+            <a:off x="6523500" y="2888225"/>
             <a:ext cx="2273400" cy="505200"/>
           </a:xfrm>
           <a:prstGeom prst="rect">
@@ -10180,7 +10146,7 @@
         </p:nvSpPr>
         <p:spPr>
           <a:xfrm>
-            <a:off x="6523500" y="3117750"/>
+            <a:off x="6454299" y="3505875"/>
             <a:ext cx="2160000" cy="1191300"/>
           </a:xfrm>
           <a:prstGeom prst="rect">
@@ -10215,7 +10181,7 @@
               <a:buAutoNum type="arabicPeriod"/>
             </a:pPr>
             <a:r>
-              <a:rPr lang="en" sz="1000" b="1">
+              <a:rPr lang="pt-BR" sz="1000" b="1" dirty="0" smtClean="0">
                 <a:solidFill>
                   <a:schemeClr val="dk1"/>
                 </a:solidFill>
@@ -10224,141 +10190,9 @@
                 <a:cs typeface="Comfortaa"/>
                 <a:sym typeface="Comfortaa"/>
               </a:rPr>
-              <a:t>Funções</a:t>
+              <a:t>Leitura de arquivos</a:t>
             </a:r>
-            <a:endParaRPr sz="1000" b="1">
-              <a:solidFill>
-                <a:schemeClr val="dk1"/>
-              </a:solidFill>
-              <a:latin typeface="Comfortaa"/>
-              <a:ea typeface="Comfortaa"/>
-              <a:cs typeface="Comfortaa"/>
-              <a:sym typeface="Comfortaa"/>
-            </a:endParaRPr>
-          </a:p>
-          <a:p>
-            <a:pPr marL="914400" lvl="1" indent="-292100" algn="l" rtl="0">
-              <a:lnSpc>
-                <a:spcPct val="200000"/>
-              </a:lnSpc>
-              <a:spcBef>
-                <a:spcPts val="0"/>
-              </a:spcBef>
-              <a:spcAft>
-                <a:spcPts val="0"/>
-              </a:spcAft>
-              <a:buClr>
-                <a:schemeClr val="dk1"/>
-              </a:buClr>
-              <a:buSzPts val="1000"/>
-              <a:buFont typeface="Comfortaa Regular"/>
-              <a:buAutoNum type="alphaLcPeriod"/>
-            </a:pPr>
-            <a:r>
-              <a:rPr lang="en" sz="1000">
-                <a:solidFill>
-                  <a:schemeClr val="dk1"/>
-                </a:solidFill>
-                <a:latin typeface="Comfortaa Regular"/>
-                <a:ea typeface="Comfortaa Regular"/>
-                <a:cs typeface="Comfortaa Regular"/>
-                <a:sym typeface="Comfortaa Regular"/>
-              </a:rPr>
-              <a:t>Args</a:t>
-            </a:r>
-            <a:endParaRPr sz="1000">
-              <a:solidFill>
-                <a:schemeClr val="dk1"/>
-              </a:solidFill>
-              <a:latin typeface="Comfortaa Regular"/>
-              <a:ea typeface="Comfortaa Regular"/>
-              <a:cs typeface="Comfortaa Regular"/>
-              <a:sym typeface="Comfortaa Regular"/>
-            </a:endParaRPr>
-          </a:p>
-          <a:p>
-            <a:pPr marL="914400" lvl="1" indent="-292100" algn="l" rtl="0">
-              <a:lnSpc>
-                <a:spcPct val="200000"/>
-              </a:lnSpc>
-              <a:spcBef>
-                <a:spcPts val="0"/>
-              </a:spcBef>
-              <a:spcAft>
-                <a:spcPts val="0"/>
-              </a:spcAft>
-              <a:buClr>
-                <a:schemeClr val="dk1"/>
-              </a:buClr>
-              <a:buSzPts val="1000"/>
-              <a:buFont typeface="Comfortaa Regular"/>
-              <a:buAutoNum type="alphaLcPeriod"/>
-            </a:pPr>
-            <a:r>
-              <a:rPr lang="en" sz="1000">
-                <a:solidFill>
-                  <a:schemeClr val="dk1"/>
-                </a:solidFill>
-                <a:latin typeface="Comfortaa Regular"/>
-                <a:ea typeface="Comfortaa Regular"/>
-                <a:cs typeface="Comfortaa Regular"/>
-                <a:sym typeface="Comfortaa Regular"/>
-              </a:rPr>
-              <a:t>Kargs  </a:t>
-            </a:r>
-            <a:r>
-              <a:rPr lang="en" sz="1000" b="1">
-                <a:solidFill>
-                  <a:schemeClr val="dk1"/>
-                </a:solidFill>
-                <a:latin typeface="Comfortaa"/>
-                <a:ea typeface="Comfortaa"/>
-                <a:cs typeface="Comfortaa"/>
-                <a:sym typeface="Comfortaa"/>
-              </a:rPr>
-              <a:t>   </a:t>
-            </a:r>
-            <a:endParaRPr sz="1000" b="1">
-              <a:solidFill>
-                <a:schemeClr val="dk1"/>
-              </a:solidFill>
-              <a:latin typeface="Comfortaa"/>
-              <a:ea typeface="Comfortaa"/>
-              <a:cs typeface="Comfortaa"/>
-              <a:sym typeface="Comfortaa"/>
-            </a:endParaRPr>
-          </a:p>
-          <a:p>
-            <a:pPr marL="457200" lvl="0" indent="-292100" algn="l" rtl="0">
-              <a:lnSpc>
-                <a:spcPct val="200000"/>
-              </a:lnSpc>
-              <a:spcBef>
-                <a:spcPts val="0"/>
-              </a:spcBef>
-              <a:spcAft>
-                <a:spcPts val="0"/>
-              </a:spcAft>
-              <a:buClr>
-                <a:schemeClr val="dk1"/>
-              </a:buClr>
-              <a:buSzPts val="1000"/>
-              <a:buFont typeface="Comfortaa"/>
-              <a:buAutoNum type="arabicPeriod"/>
-            </a:pPr>
-            <a:r>
-              <a:rPr lang="en" sz="1000" b="1">
-                <a:solidFill>
-                  <a:schemeClr val="dk1"/>
-                </a:solidFill>
-                <a:latin typeface="Comfortaa"/>
-                <a:ea typeface="Comfortaa"/>
-                <a:cs typeface="Comfortaa"/>
-                <a:sym typeface="Comfortaa"/>
-              </a:rPr>
-              <a:t>Reciclando funções</a:t>
-            </a:r>
-            <a:endParaRPr sz="1000" b="1">
+            <a:endParaRPr sz="1000" b="1" dirty="0">
               <a:solidFill>
                 <a:schemeClr val="dk1"/>
               </a:solidFill>
@@ -10378,7 +10212,7 @@
         </p:nvSpPr>
         <p:spPr>
           <a:xfrm>
-            <a:off x="3090850" y="2500100"/>
+            <a:off x="3090850" y="2888225"/>
             <a:ext cx="2273400" cy="505200"/>
           </a:xfrm>
           <a:prstGeom prst="rect">
@@ -10405,7 +10239,7 @@
               <a:buNone/>
             </a:pPr>
             <a:r>
-              <a:rPr lang="en" sz="2000" b="1">
+              <a:rPr lang="en" sz="2000" b="1" dirty="0">
                 <a:solidFill>
                   <a:schemeClr val="dk1"/>
                 </a:solidFill>
@@ -10416,7 +10250,7 @@
               </a:rPr>
               <a:t>Aula 2</a:t>
             </a:r>
-            <a:endParaRPr sz="2000" b="1">
+            <a:endParaRPr sz="2000" b="1" dirty="0">
               <a:solidFill>
                 <a:schemeClr val="dk1"/>
               </a:solidFill>
@@ -10436,8 +10270,8 @@
         </p:nvSpPr>
         <p:spPr>
           <a:xfrm>
-            <a:off x="3090850" y="3117750"/>
-            <a:ext cx="1635600" cy="1124400"/>
+            <a:off x="3090849" y="3505875"/>
+            <a:ext cx="1891551" cy="1124400"/>
           </a:xfrm>
           <a:prstGeom prst="rect">
             <a:avLst/>
@@ -10471,7 +10305,7 @@
               <a:buAutoNum type="arabicPeriod"/>
             </a:pPr>
             <a:r>
-              <a:rPr lang="en" sz="1000" b="1">
+              <a:rPr lang="en" sz="1000" b="1" dirty="0" smtClean="0">
                 <a:solidFill>
                   <a:schemeClr val="dk1"/>
                 </a:solidFill>
@@ -10480,9 +10314,9 @@
                 <a:cs typeface="Comfortaa"/>
                 <a:sym typeface="Comfortaa"/>
               </a:rPr>
-              <a:t>  Laços</a:t>
+              <a:t>Dicionários</a:t>
             </a:r>
-            <a:endParaRPr sz="1000" b="1">
+            <a:endParaRPr lang="en" sz="1000" b="1" dirty="0" smtClean="0">
               <a:solidFill>
                 <a:schemeClr val="dk1"/>
               </a:solidFill>
@@ -10493,7 +10327,7 @@
             </a:endParaRPr>
           </a:p>
           <a:p>
-            <a:pPr marL="914400" lvl="1" indent="-292100" algn="l" rtl="0">
+            <a:pPr marL="457200" lvl="0" indent="-292100" algn="l" rtl="0">
               <a:lnSpc>
                 <a:spcPct val="200000"/>
               </a:lnSpc>
@@ -10507,33 +10341,36 @@
                 <a:schemeClr val="dk1"/>
               </a:buClr>
               <a:buSzPts val="1000"/>
-              <a:buFont typeface="Comfortaa Regular"/>
-              <a:buAutoNum type="alphaLcPeriod"/>
+              <a:buFont typeface="Comfortaa"/>
+              <a:buAutoNum type="arabicPeriod"/>
             </a:pPr>
             <a:r>
-              <a:rPr lang="en" sz="1000">
+              <a:rPr lang="pt-BR" sz="1000" b="1" dirty="0" smtClean="0">
                 <a:solidFill>
                   <a:schemeClr val="dk1"/>
                 </a:solidFill>
-                <a:latin typeface="Comfortaa Regular"/>
-                <a:ea typeface="Comfortaa Regular"/>
-                <a:cs typeface="Comfortaa Regular"/>
-                <a:sym typeface="Comfortaa Regular"/>
+                <a:latin typeface="Comfortaa"/>
+                <a:ea typeface="Comfortaa"/>
+                <a:cs typeface="Comfortaa"/>
+                <a:sym typeface="Comfortaa"/>
               </a:rPr>
-              <a:t>For</a:t>
+              <a:t>P</a:t>
             </a:r>
-            <a:endParaRPr sz="1000">
-              <a:solidFill>
-                <a:schemeClr val="dk1"/>
-              </a:solidFill>
-              <a:latin typeface="Comfortaa Regular"/>
-              <a:ea typeface="Comfortaa Regular"/>
-              <a:cs typeface="Comfortaa Regular"/>
-              <a:sym typeface="Comfortaa Regular"/>
-            </a:endParaRPr>
-          </a:p>
-          <a:p>
-            <a:pPr marL="914400" lvl="1" indent="-292100" algn="l" rtl="0">
+            <a:r>
+              <a:rPr lang="en" sz="1000" b="1" dirty="0" smtClean="0">
+                <a:solidFill>
+                  <a:schemeClr val="dk1"/>
+                </a:solidFill>
+                <a:latin typeface="Comfortaa"/>
+                <a:ea typeface="Comfortaa"/>
+                <a:cs typeface="Comfortaa"/>
+                <a:sym typeface="Comfortaa"/>
+              </a:rPr>
+              <a:t>ython em prod</a:t>
+            </a:r>
+          </a:p>
+          <a:p>
+            <a:pPr marL="457200" lvl="0" indent="-292100" algn="l" rtl="0">
               <a:lnSpc>
                 <a:spcPct val="200000"/>
               </a:lnSpc>
@@ -10547,22 +10384,33 @@
                 <a:schemeClr val="dk1"/>
               </a:buClr>
               <a:buSzPts val="1000"/>
-              <a:buFont typeface="Comfortaa Regular"/>
-              <a:buAutoNum type="alphaLcPeriod"/>
+              <a:buFont typeface="Comfortaa"/>
+              <a:buAutoNum type="arabicPeriod"/>
             </a:pPr>
             <a:r>
-              <a:rPr lang="en" sz="1000">
+              <a:rPr lang="pt-BR" sz="1000" b="1" dirty="0" smtClean="0">
                 <a:solidFill>
                   <a:schemeClr val="dk1"/>
                 </a:solidFill>
-                <a:latin typeface="Comfortaa Regular"/>
-                <a:ea typeface="Comfortaa Regular"/>
-                <a:cs typeface="Comfortaa Regular"/>
-                <a:sym typeface="Comfortaa Regular"/>
+                <a:latin typeface="Comfortaa"/>
+                <a:ea typeface="Comfortaa"/>
+                <a:cs typeface="Comfortaa"/>
+                <a:sym typeface="Comfortaa"/>
               </a:rPr>
-              <a:t>While</a:t>
+              <a:t>T</a:t>
             </a:r>
-            <a:endParaRPr sz="1000"/>
+            <a:r>
+              <a:rPr lang="en" sz="1000" b="1" dirty="0" smtClean="0">
+                <a:solidFill>
+                  <a:schemeClr val="dk1"/>
+                </a:solidFill>
+                <a:latin typeface="Comfortaa"/>
+                <a:ea typeface="Comfortaa"/>
+                <a:cs typeface="Comfortaa"/>
+                <a:sym typeface="Comfortaa"/>
+              </a:rPr>
+              <a:t>upplas</a:t>
+            </a:r>
           </a:p>
         </p:txBody>
       </p:sp>
@@ -10948,7 +10796,7 @@
               <a:buAutoNum type="arabicPeriod"/>
             </a:pPr>
             <a:r>
-              <a:rPr lang="en" sz="1000" b="1">
+              <a:rPr lang="en" sz="1000" b="1" dirty="0">
                 <a:solidFill>
                   <a:schemeClr val="dk1"/>
                 </a:solidFill>
@@ -10959,7 +10807,7 @@
               </a:rPr>
               <a:t> Alguns comandos úteis</a:t>
             </a:r>
-            <a:endParaRPr sz="1000" b="1">
+            <a:endParaRPr sz="1000" b="1" dirty="0">
               <a:solidFill>
                 <a:schemeClr val="dk1"/>
               </a:solidFill>
@@ -10988,7 +10836,7 @@
               <a:buAutoNum type="arabicPeriod"/>
             </a:pPr>
             <a:r>
-              <a:rPr lang="en" sz="1000" b="1">
+              <a:rPr lang="en" sz="1000" b="1" dirty="0">
                 <a:solidFill>
                   <a:schemeClr val="dk1"/>
                 </a:solidFill>
@@ -10999,7 +10847,7 @@
               </a:rPr>
               <a:t> Bibliotecas</a:t>
             </a:r>
-            <a:endParaRPr sz="1000" b="1">
+            <a:endParaRPr sz="1000" b="1" dirty="0">
               <a:solidFill>
                 <a:schemeClr val="dk1"/>
               </a:solidFill>
@@ -11022,7 +10870,7 @@
               </a:spcAft>
               <a:buNone/>
             </a:pPr>
-            <a:endParaRPr sz="1000">
+            <a:endParaRPr sz="1000" dirty="0">
               <a:solidFill>
                 <a:schemeClr val="dk1"/>
               </a:solidFill>
@@ -11046,7 +10894,7 @@
               <a:buNone/>
             </a:pPr>
             <a:r>
-              <a:rPr lang="en" sz="1000">
+              <a:rPr lang="en" sz="1000" dirty="0">
                 <a:solidFill>
                   <a:schemeClr val="dk1"/>
                 </a:solidFill>
@@ -11057,7 +10905,7 @@
               </a:rPr>
               <a:t>        </a:t>
             </a:r>
-            <a:endParaRPr sz="1000"/>
+            <a:endParaRPr sz="1000" dirty="0"/>
           </a:p>
         </p:txBody>
       </p:sp>
@@ -11121,84 +10969,6 @@
       </p:sp>
       <p:sp>
         <p:nvSpPr>
-          <p:cNvPr id="125" name="Google Shape;125;p17"/>
-          <p:cNvSpPr txBox="1"/>
-          <p:nvPr/>
-        </p:nvSpPr>
-        <p:spPr>
-          <a:xfrm>
-            <a:off x="6360400" y="842250"/>
-            <a:ext cx="2160000" cy="814200"/>
-          </a:xfrm>
-          <a:prstGeom prst="rect">
-            <a:avLst/>
-          </a:prstGeom>
-          <a:noFill/>
-          <a:ln>
-            <a:noFill/>
-          </a:ln>
-        </p:spPr>
-        <p:txBody>
-          <a:bodyPr spcFirstLastPara="1" wrap="square" lIns="91425" tIns="91425" rIns="91425" bIns="91425" anchor="t" anchorCtr="0">
-            <a:noAutofit/>
-          </a:bodyPr>
-          <a:lstStyle/>
-          <a:p>
-            <a:pPr marL="457200" lvl="0" indent="-292100" algn="l" rtl="0">
-              <a:lnSpc>
-                <a:spcPct val="200000"/>
-              </a:lnSpc>
-              <a:spcBef>
-                <a:spcPts val="0"/>
-              </a:spcBef>
-              <a:spcAft>
-                <a:spcPts val="0"/>
-              </a:spcAft>
-              <a:buClr>
-                <a:schemeClr val="dk1"/>
-              </a:buClr>
-              <a:buSzPts val="1000"/>
-              <a:buFont typeface="Comfortaa"/>
-              <a:buAutoNum type="arabicPeriod"/>
-            </a:pPr>
-            <a:r>
-              <a:rPr lang="en" sz="1000" b="1">
-                <a:solidFill>
-                  <a:schemeClr val="dk1"/>
-                </a:solidFill>
-                <a:latin typeface="Comfortaa"/>
-                <a:ea typeface="Comfortaa"/>
-                <a:cs typeface="Comfortaa"/>
-                <a:sym typeface="Comfortaa"/>
-              </a:rPr>
-              <a:t>Leitura de arquivos </a:t>
-            </a:r>
-            <a:r>
-              <a:rPr lang="en" sz="1000">
-                <a:solidFill>
-                  <a:schemeClr val="dk1"/>
-                </a:solidFill>
-                <a:latin typeface="Comfortaa Regular"/>
-                <a:ea typeface="Comfortaa Regular"/>
-                <a:cs typeface="Comfortaa Regular"/>
-                <a:sym typeface="Comfortaa Regular"/>
-              </a:rPr>
-              <a:t>(Não se engane)</a:t>
-            </a:r>
-            <a:endParaRPr sz="1000">
-              <a:solidFill>
-                <a:schemeClr val="dk1"/>
-              </a:solidFill>
-              <a:latin typeface="Comfortaa Regular"/>
-              <a:ea typeface="Comfortaa Regular"/>
-              <a:cs typeface="Comfortaa Regular"/>
-              <a:sym typeface="Comfortaa Regular"/>
-            </a:endParaRPr>
-          </a:p>
-        </p:txBody>
-      </p:sp>
-      <p:sp>
-        <p:nvSpPr>
           <p:cNvPr id="126" name="Google Shape;126;p17"/>
           <p:cNvSpPr txBox="1"/>
           <p:nvPr/>
@@ -11351,295 +11121,6 @@
               <a:t>Aula 6</a:t>
             </a:r>
             <a:endParaRPr sz="2000" b="1">
-              <a:solidFill>
-                <a:schemeClr val="dk1"/>
-              </a:solidFill>
-              <a:latin typeface="Comfortaa"/>
-              <a:ea typeface="Comfortaa"/>
-              <a:cs typeface="Comfortaa"/>
-              <a:sym typeface="Comfortaa"/>
-            </a:endParaRPr>
-          </a:p>
-        </p:txBody>
-      </p:sp>
-      <p:sp>
-        <p:nvSpPr>
-          <p:cNvPr id="129" name="Google Shape;129;p17"/>
-          <p:cNvSpPr txBox="1"/>
-          <p:nvPr/>
-        </p:nvSpPr>
-        <p:spPr>
-          <a:xfrm>
-            <a:off x="3090850" y="2878050"/>
-            <a:ext cx="2461200" cy="1734900"/>
-          </a:xfrm>
-          <a:prstGeom prst="rect">
-            <a:avLst/>
-          </a:prstGeom>
-          <a:noFill/>
-          <a:ln>
-            <a:noFill/>
-          </a:ln>
-        </p:spPr>
-        <p:txBody>
-          <a:bodyPr spcFirstLastPara="1" wrap="square" lIns="91425" tIns="91425" rIns="91425" bIns="91425" anchor="t" anchorCtr="0">
-            <a:noAutofit/>
-          </a:bodyPr>
-          <a:lstStyle/>
-          <a:p>
-            <a:pPr marL="457200" lvl="0" indent="-292100" algn="l" rtl="0">
-              <a:lnSpc>
-                <a:spcPct val="200000"/>
-              </a:lnSpc>
-              <a:spcBef>
-                <a:spcPts val="0"/>
-              </a:spcBef>
-              <a:spcAft>
-                <a:spcPts val="0"/>
-              </a:spcAft>
-              <a:buClr>
-                <a:schemeClr val="dk1"/>
-              </a:buClr>
-              <a:buSzPts val="1000"/>
-              <a:buFont typeface="Comfortaa"/>
-              <a:buAutoNum type="arabicPeriod"/>
-            </a:pPr>
-            <a:r>
-              <a:rPr lang="en" sz="1000" b="1">
-                <a:solidFill>
-                  <a:schemeClr val="dk1"/>
-                </a:solidFill>
-                <a:latin typeface="Comfortaa"/>
-                <a:ea typeface="Comfortaa"/>
-                <a:cs typeface="Comfortaa"/>
-                <a:sym typeface="Comfortaa"/>
-              </a:rPr>
-              <a:t>Programação funcional</a:t>
-            </a:r>
-            <a:endParaRPr sz="1000" b="1">
-              <a:solidFill>
-                <a:schemeClr val="dk1"/>
-              </a:solidFill>
-              <a:latin typeface="Comfortaa"/>
-              <a:ea typeface="Comfortaa"/>
-              <a:cs typeface="Comfortaa"/>
-              <a:sym typeface="Comfortaa"/>
-            </a:endParaRPr>
-          </a:p>
-          <a:p>
-            <a:pPr marL="914400" lvl="1" indent="-292100" algn="l" rtl="0">
-              <a:lnSpc>
-                <a:spcPct val="200000"/>
-              </a:lnSpc>
-              <a:spcBef>
-                <a:spcPts val="0"/>
-              </a:spcBef>
-              <a:spcAft>
-                <a:spcPts val="0"/>
-              </a:spcAft>
-              <a:buClr>
-                <a:schemeClr val="dk1"/>
-              </a:buClr>
-              <a:buSzPts val="1000"/>
-              <a:buFont typeface="Comfortaa"/>
-              <a:buAutoNum type="alphaLcPeriod"/>
-            </a:pPr>
-            <a:r>
-              <a:rPr lang="en" sz="1000" b="1">
-                <a:solidFill>
-                  <a:schemeClr val="dk1"/>
-                </a:solidFill>
-                <a:latin typeface="Comfortaa"/>
-                <a:ea typeface="Comfortaa"/>
-                <a:cs typeface="Comfortaa"/>
-                <a:sym typeface="Comfortaa"/>
-              </a:rPr>
-              <a:t>Lambda</a:t>
-            </a:r>
-            <a:endParaRPr sz="1000" b="1">
-              <a:solidFill>
-                <a:schemeClr val="dk1"/>
-              </a:solidFill>
-              <a:latin typeface="Comfortaa"/>
-              <a:ea typeface="Comfortaa"/>
-              <a:cs typeface="Comfortaa"/>
-              <a:sym typeface="Comfortaa"/>
-            </a:endParaRPr>
-          </a:p>
-          <a:p>
-            <a:pPr marL="914400" lvl="1" indent="-292100" algn="l" rtl="0">
-              <a:lnSpc>
-                <a:spcPct val="200000"/>
-              </a:lnSpc>
-              <a:spcBef>
-                <a:spcPts val="0"/>
-              </a:spcBef>
-              <a:spcAft>
-                <a:spcPts val="0"/>
-              </a:spcAft>
-              <a:buClr>
-                <a:schemeClr val="dk1"/>
-              </a:buClr>
-              <a:buSzPts val="1000"/>
-              <a:buFont typeface="Comfortaa"/>
-              <a:buAutoNum type="alphaLcPeriod"/>
-            </a:pPr>
-            <a:r>
-              <a:rPr lang="en" sz="1000" b="1">
-                <a:solidFill>
-                  <a:schemeClr val="dk1"/>
-                </a:solidFill>
-                <a:latin typeface="Comfortaa"/>
-                <a:ea typeface="Comfortaa"/>
-                <a:cs typeface="Comfortaa"/>
-                <a:sym typeface="Comfortaa"/>
-              </a:rPr>
-              <a:t>Map</a:t>
-            </a:r>
-            <a:endParaRPr sz="1000" b="1">
-              <a:solidFill>
-                <a:schemeClr val="dk1"/>
-              </a:solidFill>
-              <a:latin typeface="Comfortaa"/>
-              <a:ea typeface="Comfortaa"/>
-              <a:cs typeface="Comfortaa"/>
-              <a:sym typeface="Comfortaa"/>
-            </a:endParaRPr>
-          </a:p>
-          <a:p>
-            <a:pPr marL="914400" lvl="1" indent="-292100" algn="l" rtl="0">
-              <a:lnSpc>
-                <a:spcPct val="200000"/>
-              </a:lnSpc>
-              <a:spcBef>
-                <a:spcPts val="0"/>
-              </a:spcBef>
-              <a:spcAft>
-                <a:spcPts val="0"/>
-              </a:spcAft>
-              <a:buClr>
-                <a:schemeClr val="dk1"/>
-              </a:buClr>
-              <a:buSzPts val="1000"/>
-              <a:buFont typeface="Comfortaa"/>
-              <a:buAutoNum type="alphaLcPeriod"/>
-            </a:pPr>
-            <a:r>
-              <a:rPr lang="en" sz="1000" b="1">
-                <a:solidFill>
-                  <a:schemeClr val="dk1"/>
-                </a:solidFill>
-                <a:latin typeface="Comfortaa"/>
-                <a:ea typeface="Comfortaa"/>
-                <a:cs typeface="Comfortaa"/>
-                <a:sym typeface="Comfortaa"/>
-              </a:rPr>
-              <a:t>Filter</a:t>
-            </a:r>
-            <a:endParaRPr sz="1000" b="1">
-              <a:solidFill>
-                <a:schemeClr val="dk1"/>
-              </a:solidFill>
-              <a:latin typeface="Comfortaa"/>
-              <a:ea typeface="Comfortaa"/>
-              <a:cs typeface="Comfortaa"/>
-              <a:sym typeface="Comfortaa"/>
-            </a:endParaRPr>
-          </a:p>
-          <a:p>
-            <a:pPr marL="914400" lvl="1" indent="-292100" algn="l" rtl="0">
-              <a:lnSpc>
-                <a:spcPct val="200000"/>
-              </a:lnSpc>
-              <a:spcBef>
-                <a:spcPts val="0"/>
-              </a:spcBef>
-              <a:spcAft>
-                <a:spcPts val="0"/>
-              </a:spcAft>
-              <a:buClr>
-                <a:schemeClr val="dk1"/>
-              </a:buClr>
-              <a:buSzPts val="1000"/>
-              <a:buFont typeface="Comfortaa"/>
-              <a:buAutoNum type="alphaLcPeriod"/>
-            </a:pPr>
-            <a:r>
-              <a:rPr lang="en" sz="1000" b="1">
-                <a:solidFill>
-                  <a:schemeClr val="dk1"/>
-                </a:solidFill>
-                <a:latin typeface="Comfortaa"/>
-                <a:ea typeface="Comfortaa"/>
-                <a:cs typeface="Comfortaa"/>
-                <a:sym typeface="Comfortaa"/>
-              </a:rPr>
-              <a:t>Reduce</a:t>
-            </a:r>
-            <a:endParaRPr sz="1000" b="1">
-              <a:solidFill>
-                <a:schemeClr val="dk1"/>
-              </a:solidFill>
-              <a:latin typeface="Comfortaa"/>
-              <a:ea typeface="Comfortaa"/>
-              <a:cs typeface="Comfortaa"/>
-              <a:sym typeface="Comfortaa"/>
-            </a:endParaRPr>
-          </a:p>
-          <a:p>
-            <a:pPr marL="914400" lvl="1" indent="-292100" algn="l" rtl="0">
-              <a:lnSpc>
-                <a:spcPct val="200000"/>
-              </a:lnSpc>
-              <a:spcBef>
-                <a:spcPts val="0"/>
-              </a:spcBef>
-              <a:spcAft>
-                <a:spcPts val="0"/>
-              </a:spcAft>
-              <a:buClr>
-                <a:schemeClr val="dk1"/>
-              </a:buClr>
-              <a:buSzPts val="1000"/>
-              <a:buFont typeface="Comfortaa"/>
-              <a:buAutoNum type="alphaLcPeriod"/>
-            </a:pPr>
-            <a:r>
-              <a:rPr lang="en" sz="1000" b="1">
-                <a:solidFill>
-                  <a:schemeClr val="dk1"/>
-                </a:solidFill>
-                <a:latin typeface="Comfortaa"/>
-                <a:ea typeface="Comfortaa"/>
-                <a:cs typeface="Comfortaa"/>
-                <a:sym typeface="Comfortaa"/>
-              </a:rPr>
-              <a:t>Zip</a:t>
-            </a:r>
-            <a:endParaRPr sz="1000" b="1">
-              <a:solidFill>
-                <a:schemeClr val="dk1"/>
-              </a:solidFill>
-              <a:latin typeface="Comfortaa"/>
-              <a:ea typeface="Comfortaa"/>
-              <a:cs typeface="Comfortaa"/>
-              <a:sym typeface="Comfortaa"/>
-            </a:endParaRPr>
-          </a:p>
-          <a:p>
-            <a:pPr marL="0" lvl="0" indent="0" algn="l" rtl="0">
-              <a:lnSpc>
-                <a:spcPct val="200000"/>
-              </a:lnSpc>
-              <a:spcBef>
-                <a:spcPts val="0"/>
-              </a:spcBef>
-              <a:spcAft>
-                <a:spcPts val="0"/>
-              </a:spcAft>
-              <a:buNone/>
-            </a:pPr>
-            <a:endParaRPr sz="1000" b="1">
               <a:solidFill>
                 <a:schemeClr val="dk1"/>
               </a:solidFill>
@@ -11685,7 +11166,7 @@
         </p:nvSpPr>
         <p:spPr>
           <a:xfrm>
-            <a:off x="6360400" y="2939100"/>
+            <a:off x="3080100" y="2766850"/>
             <a:ext cx="2461200" cy="1069200"/>
           </a:xfrm>
           <a:prstGeom prst="rect">
@@ -11859,6 +11340,216 @@
           </a:p>
         </p:txBody>
       </p:sp>
+      <p:sp>
+        <p:nvSpPr>
+          <p:cNvPr id="16" name="Google Shape;143;p18"/>
+          <p:cNvSpPr txBox="1"/>
+          <p:nvPr/>
+        </p:nvSpPr>
+        <p:spPr>
+          <a:xfrm>
+            <a:off x="6296650" y="802672"/>
+            <a:ext cx="2400900" cy="505200"/>
+          </a:xfrm>
+          <a:prstGeom prst="rect">
+            <a:avLst/>
+          </a:prstGeom>
+          <a:noFill/>
+          <a:ln>
+            <a:noFill/>
+          </a:ln>
+        </p:spPr>
+        <p:txBody>
+          <a:bodyPr spcFirstLastPara="1" wrap="square" lIns="91425" tIns="91425" rIns="91425" bIns="91425" anchor="t" anchorCtr="0">
+            <a:noAutofit/>
+          </a:bodyPr>
+          <a:lstStyle/>
+          <a:p>
+            <a:pPr marL="457200" lvl="0" indent="-292100" algn="l" rtl="0">
+              <a:lnSpc>
+                <a:spcPct val="200000"/>
+              </a:lnSpc>
+              <a:spcBef>
+                <a:spcPts val="0"/>
+              </a:spcBef>
+              <a:spcAft>
+                <a:spcPts val="0"/>
+              </a:spcAft>
+              <a:buClr>
+                <a:schemeClr val="dk1"/>
+              </a:buClr>
+              <a:buSzPts val="1000"/>
+              <a:buFont typeface="Comfortaa"/>
+              <a:buAutoNum type="arabicPeriod"/>
+            </a:pPr>
+            <a:r>
+              <a:rPr lang="en" sz="1000" b="1" dirty="0">
+                <a:solidFill>
+                  <a:schemeClr val="dk1"/>
+                </a:solidFill>
+                <a:latin typeface="Comfortaa"/>
+                <a:ea typeface="Comfortaa"/>
+                <a:cs typeface="Comfortaa"/>
+                <a:sym typeface="Comfortaa"/>
+              </a:rPr>
+              <a:t> Arquivo de configuração</a:t>
+            </a:r>
+            <a:endParaRPr sz="1000" dirty="0">
+              <a:solidFill>
+                <a:schemeClr val="dk1"/>
+              </a:solidFill>
+              <a:latin typeface="Comfortaa Regular"/>
+              <a:ea typeface="Comfortaa Regular"/>
+              <a:cs typeface="Comfortaa Regular"/>
+              <a:sym typeface="Comfortaa Regular"/>
+            </a:endParaRPr>
+          </a:p>
+        </p:txBody>
+      </p:sp>
+      <p:sp>
+        <p:nvSpPr>
+          <p:cNvPr id="17" name="Google Shape;141;p18"/>
+          <p:cNvSpPr txBox="1"/>
+          <p:nvPr/>
+        </p:nvSpPr>
+        <p:spPr>
+          <a:xfrm>
+            <a:off x="6183349" y="2765600"/>
+            <a:ext cx="2273400" cy="420900"/>
+          </a:xfrm>
+          <a:prstGeom prst="rect">
+            <a:avLst/>
+          </a:prstGeom>
+          <a:noFill/>
+          <a:ln>
+            <a:noFill/>
+          </a:ln>
+        </p:spPr>
+        <p:txBody>
+          <a:bodyPr spcFirstLastPara="1" wrap="square" lIns="91425" tIns="91425" rIns="91425" bIns="91425" anchor="t" anchorCtr="0">
+            <a:noAutofit/>
+          </a:bodyPr>
+          <a:lstStyle/>
+          <a:p>
+            <a:pPr marL="457200" lvl="0" indent="-292100" algn="l" rtl="0">
+              <a:lnSpc>
+                <a:spcPct val="200000"/>
+              </a:lnSpc>
+              <a:spcBef>
+                <a:spcPts val="0"/>
+              </a:spcBef>
+              <a:spcAft>
+                <a:spcPts val="0"/>
+              </a:spcAft>
+              <a:buClr>
+                <a:schemeClr val="dk1"/>
+              </a:buClr>
+              <a:buSzPts val="1000"/>
+              <a:buFont typeface="Comfortaa"/>
+              <a:buAutoNum type="arabicPeriod"/>
+            </a:pPr>
+            <a:r>
+              <a:rPr lang="en" sz="1000" b="1" dirty="0">
+                <a:solidFill>
+                  <a:schemeClr val="dk1"/>
+                </a:solidFill>
+                <a:latin typeface="Comfortaa"/>
+                <a:ea typeface="Comfortaa"/>
+                <a:cs typeface="Comfortaa"/>
+                <a:sym typeface="Comfortaa"/>
+              </a:rPr>
+              <a:t>Pandas</a:t>
+            </a:r>
+            <a:endParaRPr sz="1000" b="1" dirty="0">
+              <a:solidFill>
+                <a:schemeClr val="dk1"/>
+              </a:solidFill>
+              <a:latin typeface="Comfortaa"/>
+              <a:ea typeface="Comfortaa"/>
+              <a:cs typeface="Comfortaa"/>
+              <a:sym typeface="Comfortaa"/>
+            </a:endParaRPr>
+          </a:p>
+          <a:p>
+            <a:pPr marL="0" lvl="0" indent="0" algn="l" rtl="0">
+              <a:lnSpc>
+                <a:spcPct val="200000"/>
+              </a:lnSpc>
+              <a:spcBef>
+                <a:spcPts val="0"/>
+              </a:spcBef>
+              <a:spcAft>
+                <a:spcPts val="0"/>
+              </a:spcAft>
+              <a:buNone/>
+            </a:pPr>
+            <a:endParaRPr sz="1000" dirty="0">
+              <a:solidFill>
+                <a:schemeClr val="dk1"/>
+              </a:solidFill>
+              <a:latin typeface="Comfortaa Regular"/>
+              <a:ea typeface="Comfortaa Regular"/>
+              <a:cs typeface="Comfortaa Regular"/>
+              <a:sym typeface="Comfortaa Regular"/>
+            </a:endParaRPr>
+          </a:p>
+          <a:p>
+            <a:pPr marL="0" lvl="0" indent="0" algn="l" rtl="0">
+              <a:lnSpc>
+                <a:spcPct val="200000"/>
+              </a:lnSpc>
+              <a:spcBef>
+                <a:spcPts val="0"/>
+              </a:spcBef>
+              <a:spcAft>
+                <a:spcPts val="0"/>
+              </a:spcAft>
+              <a:buNone/>
+            </a:pPr>
+            <a:r>
+              <a:rPr lang="en" sz="1000" dirty="0">
+                <a:solidFill>
+                  <a:schemeClr val="dk1"/>
+                </a:solidFill>
+                <a:latin typeface="Comfortaa Regular"/>
+                <a:ea typeface="Comfortaa Regular"/>
+                <a:cs typeface="Comfortaa Regular"/>
+                <a:sym typeface="Comfortaa Regular"/>
+              </a:rPr>
+              <a:t>        </a:t>
+            </a:r>
+            <a:endParaRPr sz="1000" dirty="0"/>
+          </a:p>
+        </p:txBody>
+      </p:sp>
+      <p:pic>
+        <p:nvPicPr>
+          <p:cNvPr id="18" name="Google Shape;147;p18"/>
+          <p:cNvPicPr preferRelativeResize="0"/>
+          <p:nvPr/>
+        </p:nvPicPr>
+        <p:blipFill>
+          <a:blip r:embed="rId4">
+            <a:alphaModFix/>
+          </a:blip>
+          <a:stretch>
+            <a:fillRect/>
+          </a:stretch>
+        </p:blipFill>
+        <p:spPr>
+          <a:xfrm>
+            <a:off x="6360400" y="3270800"/>
+            <a:ext cx="644525" cy="644525"/>
+          </a:xfrm>
+          <a:prstGeom prst="rect">
+            <a:avLst/>
+          </a:prstGeom>
+          <a:noFill/>
+          <a:ln>
+            <a:noFill/>
+          </a:ln>
+        </p:spPr>
+      </p:pic>
     </p:spTree>
   </p:cSld>
   <p:clrMapOvr>
@@ -12068,7 +11759,7 @@
               <a:buNone/>
             </a:pPr>
             <a:r>
-              <a:rPr lang="en" sz="2000" b="1">
+              <a:rPr lang="en" sz="2000" b="1" dirty="0">
                 <a:solidFill>
                   <a:schemeClr val="dk1"/>
                 </a:solidFill>
@@ -12079,7 +11770,7 @@
               </a:rPr>
               <a:t>Aula 9</a:t>
             </a:r>
-            <a:endParaRPr sz="2000" b="1">
+            <a:endParaRPr sz="2000" b="1" dirty="0">
               <a:solidFill>
                 <a:schemeClr val="dk1"/>
               </a:solidFill>
@@ -12093,14 +11784,14 @@
       </p:sp>
       <p:sp>
         <p:nvSpPr>
-          <p:cNvPr id="141" name="Google Shape;141;p18"/>
+          <p:cNvPr id="142" name="Google Shape;142;p18"/>
           <p:cNvSpPr txBox="1"/>
           <p:nvPr/>
         </p:nvSpPr>
         <p:spPr>
           <a:xfrm>
-            <a:off x="3090850" y="842250"/>
-            <a:ext cx="2273400" cy="420900"/>
+            <a:off x="6360400" y="224600"/>
+            <a:ext cx="2273400" cy="505200"/>
           </a:xfrm>
           <a:prstGeom prst="rect">
             <a:avLst/>
@@ -12116,25 +11807,17 @@
           </a:bodyPr>
           <a:lstStyle/>
           <a:p>
-            <a:pPr marL="457200" lvl="0" indent="-292100" algn="l" rtl="0">
-              <a:lnSpc>
-                <a:spcPct val="200000"/>
-              </a:lnSpc>
-              <a:spcBef>
-                <a:spcPts val="0"/>
-              </a:spcBef>
-              <a:spcAft>
-                <a:spcPts val="0"/>
-              </a:spcAft>
-              <a:buClr>
-                <a:schemeClr val="dk1"/>
-              </a:buClr>
-              <a:buSzPts val="1000"/>
-              <a:buFont typeface="Comfortaa"/>
-              <a:buAutoNum type="arabicPeriod"/>
+            <a:pPr marL="0" lvl="0" indent="0" algn="l" rtl="0">
+              <a:spcBef>
+                <a:spcPts val="0"/>
+              </a:spcBef>
+              <a:spcAft>
+                <a:spcPts val="0"/>
+              </a:spcAft>
+              <a:buNone/>
             </a:pPr>
             <a:r>
-              <a:rPr lang="en" sz="1000" b="1">
+              <a:rPr lang="en" sz="2000" b="1" dirty="0">
                 <a:solidFill>
                   <a:schemeClr val="dk1"/>
                 </a:solidFill>
@@ -12143,9 +11826,9 @@
                 <a:cs typeface="Comfortaa"/>
                 <a:sym typeface="Comfortaa"/>
               </a:rPr>
-              <a:t>Pandas</a:t>
+              <a:t>Aula 10</a:t>
             </a:r>
-            <a:endParaRPr sz="1000" b="1">
+            <a:endParaRPr sz="2000" b="1" dirty="0">
               <a:solidFill>
                 <a:schemeClr val="dk1"/>
               </a:solidFill>
@@ -12153,180 +11836,6 @@
               <a:ea typeface="Comfortaa"/>
               <a:cs typeface="Comfortaa"/>
               <a:sym typeface="Comfortaa"/>
-            </a:endParaRPr>
-          </a:p>
-          <a:p>
-            <a:pPr marL="0" lvl="0" indent="0" algn="l" rtl="0">
-              <a:lnSpc>
-                <a:spcPct val="200000"/>
-              </a:lnSpc>
-              <a:spcBef>
-                <a:spcPts val="0"/>
-              </a:spcBef>
-              <a:spcAft>
-                <a:spcPts val="0"/>
-              </a:spcAft>
-              <a:buNone/>
-            </a:pPr>
-            <a:endParaRPr sz="1000">
-              <a:solidFill>
-                <a:schemeClr val="dk1"/>
-              </a:solidFill>
-              <a:latin typeface="Comfortaa Regular"/>
-              <a:ea typeface="Comfortaa Regular"/>
-              <a:cs typeface="Comfortaa Regular"/>
-              <a:sym typeface="Comfortaa Regular"/>
-            </a:endParaRPr>
-          </a:p>
-          <a:p>
-            <a:pPr marL="0" lvl="0" indent="0" algn="l" rtl="0">
-              <a:lnSpc>
-                <a:spcPct val="200000"/>
-              </a:lnSpc>
-              <a:spcBef>
-                <a:spcPts val="0"/>
-              </a:spcBef>
-              <a:spcAft>
-                <a:spcPts val="0"/>
-              </a:spcAft>
-              <a:buNone/>
-            </a:pPr>
-            <a:r>
-              <a:rPr lang="en" sz="1000">
-                <a:solidFill>
-                  <a:schemeClr val="dk1"/>
-                </a:solidFill>
-                <a:latin typeface="Comfortaa Regular"/>
-                <a:ea typeface="Comfortaa Regular"/>
-                <a:cs typeface="Comfortaa Regular"/>
-                <a:sym typeface="Comfortaa Regular"/>
-              </a:rPr>
-              <a:t>        </a:t>
-            </a:r>
-            <a:endParaRPr sz="1000"/>
-          </a:p>
-        </p:txBody>
-      </p:sp>
-      <p:sp>
-        <p:nvSpPr>
-          <p:cNvPr id="142" name="Google Shape;142;p18"/>
-          <p:cNvSpPr txBox="1"/>
-          <p:nvPr/>
-        </p:nvSpPr>
-        <p:spPr>
-          <a:xfrm>
-            <a:off x="6360400" y="224600"/>
-            <a:ext cx="2273400" cy="505200"/>
-          </a:xfrm>
-          <a:prstGeom prst="rect">
-            <a:avLst/>
-          </a:prstGeom>
-          <a:noFill/>
-          <a:ln>
-            <a:noFill/>
-          </a:ln>
-        </p:spPr>
-        <p:txBody>
-          <a:bodyPr spcFirstLastPara="1" wrap="square" lIns="91425" tIns="91425" rIns="91425" bIns="91425" anchor="t" anchorCtr="0">
-            <a:noAutofit/>
-          </a:bodyPr>
-          <a:lstStyle/>
-          <a:p>
-            <a:pPr marL="0" lvl="0" indent="0" algn="l" rtl="0">
-              <a:spcBef>
-                <a:spcPts val="0"/>
-              </a:spcBef>
-              <a:spcAft>
-                <a:spcPts val="0"/>
-              </a:spcAft>
-              <a:buNone/>
-            </a:pPr>
-            <a:r>
-              <a:rPr lang="en" sz="2000" b="1">
-                <a:solidFill>
-                  <a:schemeClr val="dk1"/>
-                </a:solidFill>
-                <a:latin typeface="Comfortaa"/>
-                <a:ea typeface="Comfortaa"/>
-                <a:cs typeface="Comfortaa"/>
-                <a:sym typeface="Comfortaa"/>
-              </a:rPr>
-              <a:t>Aula 10</a:t>
-            </a:r>
-            <a:endParaRPr sz="2000" b="1">
-              <a:solidFill>
-                <a:schemeClr val="dk1"/>
-              </a:solidFill>
-              <a:latin typeface="Comfortaa"/>
-              <a:ea typeface="Comfortaa"/>
-              <a:cs typeface="Comfortaa"/>
-              <a:sym typeface="Comfortaa"/>
-            </a:endParaRPr>
-          </a:p>
-        </p:txBody>
-      </p:sp>
-      <p:sp>
-        <p:nvSpPr>
-          <p:cNvPr id="143" name="Google Shape;143;p18"/>
-          <p:cNvSpPr txBox="1"/>
-          <p:nvPr/>
-        </p:nvSpPr>
-        <p:spPr>
-          <a:xfrm>
-            <a:off x="6360400" y="842250"/>
-            <a:ext cx="2400900" cy="505200"/>
-          </a:xfrm>
-          <a:prstGeom prst="rect">
-            <a:avLst/>
-          </a:prstGeom>
-          <a:noFill/>
-          <a:ln>
-            <a:noFill/>
-          </a:ln>
-        </p:spPr>
-        <p:txBody>
-          <a:bodyPr spcFirstLastPara="1" wrap="square" lIns="91425" tIns="91425" rIns="91425" bIns="91425" anchor="t" anchorCtr="0">
-            <a:noAutofit/>
-          </a:bodyPr>
-          <a:lstStyle/>
-          <a:p>
-            <a:pPr marL="457200" lvl="0" indent="-292100" algn="l" rtl="0">
-              <a:lnSpc>
-                <a:spcPct val="200000"/>
-              </a:lnSpc>
-              <a:spcBef>
-                <a:spcPts val="0"/>
-              </a:spcBef>
-              <a:spcAft>
-                <a:spcPts val="0"/>
-              </a:spcAft>
-              <a:buClr>
-                <a:schemeClr val="dk1"/>
-              </a:buClr>
-              <a:buSzPts val="1000"/>
-              <a:buFont typeface="Comfortaa"/>
-              <a:buAutoNum type="arabicPeriod"/>
-            </a:pPr>
-            <a:r>
-              <a:rPr lang="en" sz="1000" b="1">
-                <a:solidFill>
-                  <a:schemeClr val="dk1"/>
-                </a:solidFill>
-                <a:latin typeface="Comfortaa"/>
-                <a:ea typeface="Comfortaa"/>
-                <a:cs typeface="Comfortaa"/>
-                <a:sym typeface="Comfortaa"/>
-              </a:rPr>
-              <a:t> Arquivo de configuração</a:t>
-            </a:r>
-            <a:endParaRPr sz="1000">
-              <a:solidFill>
-                <a:schemeClr val="dk1"/>
-              </a:solidFill>
-              <a:latin typeface="Comfortaa Regular"/>
-              <a:ea typeface="Comfortaa Regular"/>
-              <a:cs typeface="Comfortaa Regular"/>
-              <a:sym typeface="Comfortaa Regular"/>
             </a:endParaRPr>
           </a:p>
         </p:txBody>
@@ -12339,7 +11848,7 @@
         </p:nvSpPr>
         <p:spPr>
           <a:xfrm>
-            <a:off x="3181525" y="3135300"/>
+            <a:off x="3181525" y="3686975"/>
             <a:ext cx="3671400" cy="644400"/>
           </a:xfrm>
           <a:prstGeom prst="rect">
@@ -12400,7 +11909,7 @@
         </p:nvSpPr>
         <p:spPr>
           <a:xfrm>
-            <a:off x="3090850" y="2532725"/>
+            <a:off x="3090850" y="3084400"/>
             <a:ext cx="4057200" cy="462600"/>
           </a:xfrm>
           <a:prstGeom prst="rect">
@@ -12430,7 +11939,7 @@
               <a:buNone/>
             </a:pPr>
             <a:r>
-              <a:rPr lang="en" sz="2000" b="1">
+              <a:rPr lang="en" sz="2000" b="1" dirty="0">
                 <a:solidFill>
                   <a:schemeClr val="dk1"/>
                 </a:solidFill>
@@ -12442,7 +11951,7 @@
               <a:t>Projeto </a:t>
             </a:r>
             <a:r>
-              <a:rPr lang="en" sz="2000" b="1" smtClean="0">
+              <a:rPr lang="en" sz="2000" b="1" dirty="0" smtClean="0">
                 <a:solidFill>
                   <a:schemeClr val="dk1"/>
                 </a:solidFill>
@@ -12474,7 +11983,7 @@
         <p:spPr>
           <a:xfrm>
             <a:off x="5718350" y="279875"/>
-            <a:ext cx="0" cy="1618800"/>
+            <a:ext cx="0" cy="2227019"/>
           </a:xfrm>
           <a:prstGeom prst="straightConnector1">
             <a:avLst/>
@@ -12491,34 +12000,6 @@
           </a:ln>
         </p:spPr>
       </p:cxnSp>
-      <p:pic>
-        <p:nvPicPr>
-          <p:cNvPr id="147" name="Google Shape;147;p18"/>
-          <p:cNvPicPr preferRelativeResize="0"/>
-          <p:nvPr/>
-        </p:nvPicPr>
-        <p:blipFill>
-          <a:blip r:embed="rId4">
-            <a:alphaModFix/>
-          </a:blip>
-          <a:stretch>
-            <a:fillRect/>
-          </a:stretch>
-        </p:blipFill>
-        <p:spPr>
-          <a:xfrm>
-            <a:off x="4680500" y="947875"/>
-            <a:ext cx="644525" cy="644525"/>
-          </a:xfrm>
-          <a:prstGeom prst="rect">
-            <a:avLst/>
-          </a:prstGeom>
-          <a:noFill/>
-          <a:ln>
-            <a:noFill/>
-          </a:ln>
-        </p:spPr>
-      </p:pic>
       <p:sp>
         <p:nvSpPr>
           <p:cNvPr id="148" name="Google Shape;148;p18"/>
@@ -12597,6 +12078,411 @@
               <a:cs typeface="Comfortaa Regular"/>
               <a:sym typeface="Comfortaa Regular"/>
             </a:endParaRPr>
+          </a:p>
+        </p:txBody>
+      </p:sp>
+      <p:sp>
+        <p:nvSpPr>
+          <p:cNvPr id="14" name="Google Shape;129;p17"/>
+          <p:cNvSpPr txBox="1"/>
+          <p:nvPr/>
+        </p:nvSpPr>
+        <p:spPr>
+          <a:xfrm>
+            <a:off x="2996950" y="657850"/>
+            <a:ext cx="2461200" cy="1734900"/>
+          </a:xfrm>
+          <a:prstGeom prst="rect">
+            <a:avLst/>
+          </a:prstGeom>
+          <a:noFill/>
+          <a:ln>
+            <a:noFill/>
+          </a:ln>
+        </p:spPr>
+        <p:txBody>
+          <a:bodyPr spcFirstLastPara="1" wrap="square" lIns="91425" tIns="91425" rIns="91425" bIns="91425" anchor="t" anchorCtr="0">
+            <a:noAutofit/>
+          </a:bodyPr>
+          <a:lstStyle/>
+          <a:p>
+            <a:pPr marL="457200" lvl="0" indent="-292100" algn="l" rtl="0">
+              <a:lnSpc>
+                <a:spcPct val="200000"/>
+              </a:lnSpc>
+              <a:spcBef>
+                <a:spcPts val="0"/>
+              </a:spcBef>
+              <a:spcAft>
+                <a:spcPts val="0"/>
+              </a:spcAft>
+              <a:buClr>
+                <a:schemeClr val="dk1"/>
+              </a:buClr>
+              <a:buSzPts val="1000"/>
+              <a:buFont typeface="Comfortaa"/>
+              <a:buAutoNum type="arabicPeriod"/>
+            </a:pPr>
+            <a:r>
+              <a:rPr lang="en" sz="1000" b="1" dirty="0">
+                <a:solidFill>
+                  <a:schemeClr val="dk1"/>
+                </a:solidFill>
+                <a:latin typeface="Comfortaa"/>
+                <a:ea typeface="Comfortaa"/>
+                <a:cs typeface="Comfortaa"/>
+                <a:sym typeface="Comfortaa"/>
+              </a:rPr>
+              <a:t>Programação funcional</a:t>
+            </a:r>
+            <a:endParaRPr sz="1000" b="1" dirty="0">
+              <a:solidFill>
+                <a:schemeClr val="dk1"/>
+              </a:solidFill>
+              <a:latin typeface="Comfortaa"/>
+              <a:ea typeface="Comfortaa"/>
+              <a:cs typeface="Comfortaa"/>
+              <a:sym typeface="Comfortaa"/>
+            </a:endParaRPr>
+          </a:p>
+          <a:p>
+            <a:pPr marL="914400" lvl="1" indent="-292100" algn="l" rtl="0">
+              <a:lnSpc>
+                <a:spcPct val="200000"/>
+              </a:lnSpc>
+              <a:spcBef>
+                <a:spcPts val="0"/>
+              </a:spcBef>
+              <a:spcAft>
+                <a:spcPts val="0"/>
+              </a:spcAft>
+              <a:buClr>
+                <a:schemeClr val="dk1"/>
+              </a:buClr>
+              <a:buSzPts val="1000"/>
+              <a:buFont typeface="Comfortaa"/>
+              <a:buAutoNum type="alphaLcPeriod"/>
+            </a:pPr>
+            <a:r>
+              <a:rPr lang="en" sz="1000" b="1" dirty="0">
+                <a:solidFill>
+                  <a:schemeClr val="dk1"/>
+                </a:solidFill>
+                <a:latin typeface="Comfortaa"/>
+                <a:ea typeface="Comfortaa"/>
+                <a:cs typeface="Comfortaa"/>
+                <a:sym typeface="Comfortaa"/>
+              </a:rPr>
+              <a:t>Lambda</a:t>
+            </a:r>
+            <a:endParaRPr sz="1000" b="1" dirty="0">
+              <a:solidFill>
+                <a:schemeClr val="dk1"/>
+              </a:solidFill>
+              <a:latin typeface="Comfortaa"/>
+              <a:ea typeface="Comfortaa"/>
+              <a:cs typeface="Comfortaa"/>
+              <a:sym typeface="Comfortaa"/>
+            </a:endParaRPr>
+          </a:p>
+          <a:p>
+            <a:pPr marL="914400" lvl="1" indent="-292100" algn="l" rtl="0">
+              <a:lnSpc>
+                <a:spcPct val="200000"/>
+              </a:lnSpc>
+              <a:spcBef>
+                <a:spcPts val="0"/>
+              </a:spcBef>
+              <a:spcAft>
+                <a:spcPts val="0"/>
+              </a:spcAft>
+              <a:buClr>
+                <a:schemeClr val="dk1"/>
+              </a:buClr>
+              <a:buSzPts val="1000"/>
+              <a:buFont typeface="Comfortaa"/>
+              <a:buAutoNum type="alphaLcPeriod"/>
+            </a:pPr>
+            <a:r>
+              <a:rPr lang="en" sz="1000" b="1" dirty="0">
+                <a:solidFill>
+                  <a:schemeClr val="dk1"/>
+                </a:solidFill>
+                <a:latin typeface="Comfortaa"/>
+                <a:ea typeface="Comfortaa"/>
+                <a:cs typeface="Comfortaa"/>
+                <a:sym typeface="Comfortaa"/>
+              </a:rPr>
+              <a:t>Map</a:t>
+            </a:r>
+            <a:endParaRPr sz="1000" b="1" dirty="0">
+              <a:solidFill>
+                <a:schemeClr val="dk1"/>
+              </a:solidFill>
+              <a:latin typeface="Comfortaa"/>
+              <a:ea typeface="Comfortaa"/>
+              <a:cs typeface="Comfortaa"/>
+              <a:sym typeface="Comfortaa"/>
+            </a:endParaRPr>
+          </a:p>
+          <a:p>
+            <a:pPr marL="914400" lvl="1" indent="-292100" algn="l" rtl="0">
+              <a:lnSpc>
+                <a:spcPct val="200000"/>
+              </a:lnSpc>
+              <a:spcBef>
+                <a:spcPts val="0"/>
+              </a:spcBef>
+              <a:spcAft>
+                <a:spcPts val="0"/>
+              </a:spcAft>
+              <a:buClr>
+                <a:schemeClr val="dk1"/>
+              </a:buClr>
+              <a:buSzPts val="1000"/>
+              <a:buFont typeface="Comfortaa"/>
+              <a:buAutoNum type="alphaLcPeriod"/>
+            </a:pPr>
+            <a:r>
+              <a:rPr lang="en" sz="1000" b="1" dirty="0">
+                <a:solidFill>
+                  <a:schemeClr val="dk1"/>
+                </a:solidFill>
+                <a:latin typeface="Comfortaa"/>
+                <a:ea typeface="Comfortaa"/>
+                <a:cs typeface="Comfortaa"/>
+                <a:sym typeface="Comfortaa"/>
+              </a:rPr>
+              <a:t>Filter</a:t>
+            </a:r>
+            <a:endParaRPr sz="1000" b="1" dirty="0">
+              <a:solidFill>
+                <a:schemeClr val="dk1"/>
+              </a:solidFill>
+              <a:latin typeface="Comfortaa"/>
+              <a:ea typeface="Comfortaa"/>
+              <a:cs typeface="Comfortaa"/>
+              <a:sym typeface="Comfortaa"/>
+            </a:endParaRPr>
+          </a:p>
+          <a:p>
+            <a:pPr marL="914400" lvl="1" indent="-292100" algn="l" rtl="0">
+              <a:lnSpc>
+                <a:spcPct val="200000"/>
+              </a:lnSpc>
+              <a:spcBef>
+                <a:spcPts val="0"/>
+              </a:spcBef>
+              <a:spcAft>
+                <a:spcPts val="0"/>
+              </a:spcAft>
+              <a:buClr>
+                <a:schemeClr val="dk1"/>
+              </a:buClr>
+              <a:buSzPts val="1000"/>
+              <a:buFont typeface="Comfortaa"/>
+              <a:buAutoNum type="alphaLcPeriod"/>
+            </a:pPr>
+            <a:r>
+              <a:rPr lang="en" sz="1000" b="1" dirty="0">
+                <a:solidFill>
+                  <a:schemeClr val="dk1"/>
+                </a:solidFill>
+                <a:latin typeface="Comfortaa"/>
+                <a:ea typeface="Comfortaa"/>
+                <a:cs typeface="Comfortaa"/>
+                <a:sym typeface="Comfortaa"/>
+              </a:rPr>
+              <a:t>Reduce</a:t>
+            </a:r>
+            <a:endParaRPr sz="1000" b="1" dirty="0">
+              <a:solidFill>
+                <a:schemeClr val="dk1"/>
+              </a:solidFill>
+              <a:latin typeface="Comfortaa"/>
+              <a:ea typeface="Comfortaa"/>
+              <a:cs typeface="Comfortaa"/>
+              <a:sym typeface="Comfortaa"/>
+            </a:endParaRPr>
+          </a:p>
+          <a:p>
+            <a:pPr marL="914400" lvl="1" indent="-292100" algn="l" rtl="0">
+              <a:lnSpc>
+                <a:spcPct val="200000"/>
+              </a:lnSpc>
+              <a:spcBef>
+                <a:spcPts val="0"/>
+              </a:spcBef>
+              <a:spcAft>
+                <a:spcPts val="0"/>
+              </a:spcAft>
+              <a:buClr>
+                <a:schemeClr val="dk1"/>
+              </a:buClr>
+              <a:buSzPts val="1000"/>
+              <a:buFont typeface="Comfortaa"/>
+              <a:buAutoNum type="alphaLcPeriod"/>
+            </a:pPr>
+            <a:r>
+              <a:rPr lang="en" sz="1000" b="1" dirty="0">
+                <a:solidFill>
+                  <a:schemeClr val="dk1"/>
+                </a:solidFill>
+                <a:latin typeface="Comfortaa"/>
+                <a:ea typeface="Comfortaa"/>
+                <a:cs typeface="Comfortaa"/>
+                <a:sym typeface="Comfortaa"/>
+              </a:rPr>
+              <a:t>Zip</a:t>
+            </a:r>
+            <a:endParaRPr sz="1000" b="1" dirty="0">
+              <a:solidFill>
+                <a:schemeClr val="dk1"/>
+              </a:solidFill>
+              <a:latin typeface="Comfortaa"/>
+              <a:ea typeface="Comfortaa"/>
+              <a:cs typeface="Comfortaa"/>
+              <a:sym typeface="Comfortaa"/>
+            </a:endParaRPr>
+          </a:p>
+          <a:p>
+            <a:pPr marL="0" lvl="0" indent="0" algn="l" rtl="0">
+              <a:lnSpc>
+                <a:spcPct val="200000"/>
+              </a:lnSpc>
+              <a:spcBef>
+                <a:spcPts val="0"/>
+              </a:spcBef>
+              <a:spcAft>
+                <a:spcPts val="0"/>
+              </a:spcAft>
+              <a:buNone/>
+            </a:pPr>
+            <a:endParaRPr sz="1000" b="1" dirty="0">
+              <a:solidFill>
+                <a:schemeClr val="dk1"/>
+              </a:solidFill>
+              <a:latin typeface="Comfortaa"/>
+              <a:ea typeface="Comfortaa"/>
+              <a:cs typeface="Comfortaa"/>
+              <a:sym typeface="Comfortaa"/>
+            </a:endParaRPr>
+          </a:p>
+        </p:txBody>
+      </p:sp>
+      <p:sp>
+        <p:nvSpPr>
+          <p:cNvPr id="15" name="Google Shape;141;p18"/>
+          <p:cNvSpPr txBox="1"/>
+          <p:nvPr/>
+        </p:nvSpPr>
+        <p:spPr>
+          <a:xfrm>
+            <a:off x="6360400" y="657850"/>
+            <a:ext cx="2273400" cy="420900"/>
+          </a:xfrm>
+          <a:prstGeom prst="rect">
+            <a:avLst/>
+          </a:prstGeom>
+          <a:noFill/>
+          <a:ln>
+            <a:noFill/>
+          </a:ln>
+        </p:spPr>
+        <p:txBody>
+          <a:bodyPr spcFirstLastPara="1" wrap="square" lIns="91425" tIns="91425" rIns="91425" bIns="91425" anchor="t" anchorCtr="0">
+            <a:noAutofit/>
+          </a:bodyPr>
+          <a:lstStyle/>
+          <a:p>
+            <a:pPr marL="457200" lvl="0" indent="-292100" algn="l" rtl="0">
+              <a:lnSpc>
+                <a:spcPct val="200000"/>
+              </a:lnSpc>
+              <a:spcBef>
+                <a:spcPts val="0"/>
+              </a:spcBef>
+              <a:spcAft>
+                <a:spcPts val="0"/>
+              </a:spcAft>
+              <a:buClr>
+                <a:schemeClr val="dk1"/>
+              </a:buClr>
+              <a:buSzPts val="1000"/>
+              <a:buFont typeface="Comfortaa"/>
+              <a:buAutoNum type="arabicPeriod"/>
+            </a:pPr>
+            <a:r>
+              <a:rPr lang="pt-BR" sz="1000" b="1" dirty="0" smtClean="0">
+                <a:solidFill>
+                  <a:schemeClr val="dk1"/>
+                </a:solidFill>
+                <a:latin typeface="Comfortaa"/>
+                <a:ea typeface="Comfortaa"/>
+                <a:cs typeface="Comfortaa"/>
+                <a:sym typeface="Comfortaa"/>
+              </a:rPr>
+              <a:t>duvidas</a:t>
+            </a:r>
+            <a:endParaRPr sz="1000" b="1" dirty="0">
+              <a:solidFill>
+                <a:schemeClr val="dk1"/>
+              </a:solidFill>
+              <a:latin typeface="Comfortaa"/>
+              <a:ea typeface="Comfortaa"/>
+              <a:cs typeface="Comfortaa"/>
+              <a:sym typeface="Comfortaa"/>
+            </a:endParaRPr>
+          </a:p>
+          <a:p>
+            <a:pPr marL="0" lvl="0" indent="0" algn="l" rtl="0">
+              <a:lnSpc>
+                <a:spcPct val="200000"/>
+              </a:lnSpc>
+              <a:spcBef>
+                <a:spcPts val="0"/>
+              </a:spcBef>
+              <a:spcAft>
+                <a:spcPts val="0"/>
+              </a:spcAft>
+              <a:buNone/>
+            </a:pPr>
+            <a:endParaRPr sz="1000" dirty="0">
+              <a:solidFill>
+                <a:schemeClr val="dk1"/>
+              </a:solidFill>
+              <a:latin typeface="Comfortaa Regular"/>
+              <a:ea typeface="Comfortaa Regular"/>
+              <a:cs typeface="Comfortaa Regular"/>
+              <a:sym typeface="Comfortaa Regular"/>
+            </a:endParaRPr>
+          </a:p>
+          <a:p>
+            <a:pPr marL="0" lvl="0" indent="0" algn="l" rtl="0">
+              <a:lnSpc>
+                <a:spcPct val="200000"/>
+              </a:lnSpc>
+              <a:spcBef>
+                <a:spcPts val="0"/>
+              </a:spcBef>
+              <a:spcAft>
+                <a:spcPts val="0"/>
+              </a:spcAft>
+              <a:buNone/>
+            </a:pPr>
+            <a:r>
+              <a:rPr lang="en" sz="1000" dirty="0">
+                <a:solidFill>
+                  <a:schemeClr val="dk1"/>
+                </a:solidFill>
+                <a:latin typeface="Comfortaa Regular"/>
+                <a:ea typeface="Comfortaa Regular"/>
+                <a:cs typeface="Comfortaa Regular"/>
+                <a:sym typeface="Comfortaa Regular"/>
+              </a:rPr>
+              <a:t>        </a:t>
+            </a:r>
+            <a:endParaRPr sz="1000" dirty="0"/>
           </a:p>
         </p:txBody>
       </p:sp>
@@ -12616,6 +12502,903 @@
 </file>
 
 <file path=ppt/slides/slide7.xml><?xml version="1.0" encoding="utf-8"?>
+<p:sld xmlns:a="http://schemas.openxmlformats.org/drawingml/2006/main" xmlns:r="http://schemas.openxmlformats.org/officeDocument/2006/relationships" xmlns:p="http://schemas.openxmlformats.org/presentationml/2006/main">
+  <p:cSld>
+    <p:spTree>
+      <p:nvGrpSpPr>
+        <p:cNvPr id="1" name="Shape 173"/>
+        <p:cNvGrpSpPr/>
+        <p:nvPr/>
+      </p:nvGrpSpPr>
+      <p:grpSpPr>
+        <a:xfrm>
+          <a:off x="0" y="0"/>
+          <a:ext cx="0" cy="0"/>
+          <a:chOff x="0" y="0"/>
+          <a:chExt cx="0" cy="0"/>
+        </a:xfrm>
+      </p:grpSpPr>
+      <p:pic>
+        <p:nvPicPr>
+          <p:cNvPr id="174" name="Google Shape;174;p21"/>
+          <p:cNvPicPr preferRelativeResize="0"/>
+          <p:nvPr/>
+        </p:nvPicPr>
+        <p:blipFill rotWithShape="1">
+          <a:blip r:embed="rId3">
+            <a:alphaModFix/>
+          </a:blip>
+          <a:srcRect l="13057" r="39409"/>
+          <a:stretch/>
+        </p:blipFill>
+        <p:spPr>
+          <a:xfrm>
+            <a:off x="0" y="0"/>
+            <a:ext cx="2533499" cy="5174700"/>
+          </a:xfrm>
+          <a:prstGeom prst="rect">
+            <a:avLst/>
+          </a:prstGeom>
+          <a:noFill/>
+          <a:ln>
+            <a:noFill/>
+          </a:ln>
+        </p:spPr>
+      </p:pic>
+      <p:sp>
+        <p:nvSpPr>
+          <p:cNvPr id="175" name="Google Shape;175;p21"/>
+          <p:cNvSpPr/>
+          <p:nvPr/>
+        </p:nvSpPr>
+        <p:spPr>
+          <a:xfrm flipH="1">
+            <a:off x="0" y="0"/>
+            <a:ext cx="2533500" cy="5174700"/>
+          </a:xfrm>
+          <a:prstGeom prst="rect">
+            <a:avLst/>
+          </a:prstGeom>
+          <a:solidFill>
+            <a:srgbClr val="000000">
+              <a:alpha val="34080"/>
+            </a:srgbClr>
+          </a:solidFill>
+          <a:ln>
+            <a:noFill/>
+          </a:ln>
+        </p:spPr>
+        <p:txBody>
+          <a:bodyPr spcFirstLastPara="1" wrap="square" lIns="91425" tIns="91425" rIns="91425" bIns="91425" anchor="ctr" anchorCtr="0">
+            <a:noAutofit/>
+          </a:bodyPr>
+          <a:lstStyle/>
+          <a:p>
+            <a:pPr marL="0" lvl="0" indent="0" algn="l" rtl="0">
+              <a:spcBef>
+                <a:spcPts val="0"/>
+              </a:spcBef>
+              <a:spcAft>
+                <a:spcPts val="0"/>
+              </a:spcAft>
+              <a:buNone/>
+            </a:pPr>
+            <a:endParaRPr/>
+          </a:p>
+        </p:txBody>
+      </p:sp>
+      <p:sp>
+        <p:nvSpPr>
+          <p:cNvPr id="176" name="Google Shape;176;p21"/>
+          <p:cNvSpPr txBox="1"/>
+          <p:nvPr/>
+        </p:nvSpPr>
+        <p:spPr>
+          <a:xfrm>
+            <a:off x="66300" y="391475"/>
+            <a:ext cx="2400900" cy="2324400"/>
+          </a:xfrm>
+          <a:prstGeom prst="rect">
+            <a:avLst/>
+          </a:prstGeom>
+          <a:noFill/>
+          <a:ln>
+            <a:noFill/>
+          </a:ln>
+        </p:spPr>
+        <p:txBody>
+          <a:bodyPr spcFirstLastPara="1" wrap="square" lIns="91425" tIns="91425" rIns="91425" bIns="91425" anchor="t" anchorCtr="0">
+            <a:noAutofit/>
+          </a:bodyPr>
+          <a:lstStyle/>
+          <a:p>
+            <a:pPr marL="0" lvl="0" indent="0" algn="l" rtl="0">
+              <a:lnSpc>
+                <a:spcPct val="115000"/>
+              </a:lnSpc>
+              <a:spcBef>
+                <a:spcPts val="0"/>
+              </a:spcBef>
+              <a:spcAft>
+                <a:spcPts val="0"/>
+              </a:spcAft>
+              <a:buNone/>
+            </a:pPr>
+            <a:r>
+              <a:rPr lang="en" sz="3200" b="1" dirty="0">
+                <a:solidFill>
+                  <a:schemeClr val="lt1"/>
+                </a:solidFill>
+                <a:latin typeface="Comfortaa"/>
+                <a:ea typeface="Comfortaa"/>
+                <a:cs typeface="Comfortaa"/>
+                <a:sym typeface="Comfortaa"/>
+              </a:rPr>
+              <a:t>Quais seriam seus poderes? </a:t>
+            </a:r>
+            <a:endParaRPr sz="3900" b="1" dirty="0">
+              <a:solidFill>
+                <a:schemeClr val="lt1"/>
+              </a:solidFill>
+              <a:latin typeface="Comfortaa"/>
+              <a:ea typeface="Comfortaa"/>
+              <a:cs typeface="Comfortaa"/>
+              <a:sym typeface="Comfortaa"/>
+            </a:endParaRPr>
+          </a:p>
+        </p:txBody>
+      </p:sp>
+      <p:sp>
+        <p:nvSpPr>
+          <p:cNvPr id="177" name="Google Shape;177;p21"/>
+          <p:cNvSpPr txBox="1"/>
+          <p:nvPr/>
+        </p:nvSpPr>
+        <p:spPr>
+          <a:xfrm>
+            <a:off x="3090850" y="224600"/>
+            <a:ext cx="4084800" cy="505200"/>
+          </a:xfrm>
+          <a:prstGeom prst="rect">
+            <a:avLst/>
+          </a:prstGeom>
+          <a:noFill/>
+          <a:ln>
+            <a:noFill/>
+          </a:ln>
+        </p:spPr>
+        <p:txBody>
+          <a:bodyPr spcFirstLastPara="1" wrap="square" lIns="91425" tIns="91425" rIns="91425" bIns="91425" anchor="t" anchorCtr="0">
+            <a:noAutofit/>
+          </a:bodyPr>
+          <a:lstStyle/>
+          <a:p>
+            <a:pPr marL="0" lvl="0" indent="0" algn="l" rtl="0">
+              <a:spcBef>
+                <a:spcPts val="0"/>
+              </a:spcBef>
+              <a:spcAft>
+                <a:spcPts val="0"/>
+              </a:spcAft>
+              <a:buNone/>
+            </a:pPr>
+            <a:r>
+              <a:rPr lang="en" sz="2000" b="1">
+                <a:solidFill>
+                  <a:schemeClr val="dk1"/>
+                </a:solidFill>
+                <a:latin typeface="Comfortaa"/>
+                <a:ea typeface="Comfortaa"/>
+                <a:cs typeface="Comfortaa"/>
+                <a:sym typeface="Comfortaa"/>
+              </a:rPr>
+              <a:t>Quebra gelo!</a:t>
+            </a:r>
+            <a:endParaRPr sz="2000" b="1">
+              <a:solidFill>
+                <a:schemeClr val="dk1"/>
+              </a:solidFill>
+              <a:latin typeface="Comfortaa"/>
+              <a:ea typeface="Comfortaa"/>
+              <a:cs typeface="Comfortaa"/>
+              <a:sym typeface="Comfortaa"/>
+            </a:endParaRPr>
+          </a:p>
+        </p:txBody>
+      </p:sp>
+      <p:sp>
+        <p:nvSpPr>
+          <p:cNvPr id="178" name="Google Shape;178;p21"/>
+          <p:cNvSpPr txBox="1"/>
+          <p:nvPr/>
+        </p:nvSpPr>
+        <p:spPr>
+          <a:xfrm>
+            <a:off x="3090850" y="698525"/>
+            <a:ext cx="5321900" cy="693300"/>
+          </a:xfrm>
+          <a:prstGeom prst="rect">
+            <a:avLst/>
+          </a:prstGeom>
+          <a:noFill/>
+          <a:ln>
+            <a:noFill/>
+          </a:ln>
+        </p:spPr>
+        <p:txBody>
+          <a:bodyPr spcFirstLastPara="1" wrap="square" lIns="91425" tIns="91425" rIns="91425" bIns="91425" anchor="t" anchorCtr="0">
+            <a:noAutofit/>
+          </a:bodyPr>
+          <a:lstStyle/>
+          <a:p>
+            <a:pPr marL="0" lvl="0" indent="0" algn="l" rtl="0">
+              <a:lnSpc>
+                <a:spcPct val="200000"/>
+              </a:lnSpc>
+              <a:spcBef>
+                <a:spcPts val="0"/>
+              </a:spcBef>
+              <a:spcAft>
+                <a:spcPts val="0"/>
+              </a:spcAft>
+              <a:buNone/>
+            </a:pPr>
+            <a:r>
+              <a:rPr lang="en" sz="1000" dirty="0">
+                <a:solidFill>
+                  <a:schemeClr val="dk1"/>
+                </a:solidFill>
+                <a:latin typeface="Comfortaa Regular"/>
+                <a:ea typeface="Comfortaa Regular"/>
+                <a:cs typeface="Comfortaa Regular"/>
+                <a:sym typeface="Comfortaa Regular"/>
+              </a:rPr>
+              <a:t>Para nos conhecermos melhor, vamos fazer uma dinâmica de Team Building </a:t>
+            </a:r>
+            <a:endParaRPr lang="en" sz="1000" dirty="0" smtClean="0">
+              <a:solidFill>
+                <a:schemeClr val="dk1"/>
+              </a:solidFill>
+              <a:latin typeface="Comfortaa Regular"/>
+              <a:ea typeface="Comfortaa Regular"/>
+              <a:cs typeface="Comfortaa Regular"/>
+              <a:sym typeface="Comfortaa Regular"/>
+            </a:endParaRPr>
+          </a:p>
+          <a:p>
+            <a:pPr marL="0" lvl="0" indent="0" algn="l" rtl="0">
+              <a:lnSpc>
+                <a:spcPct val="200000"/>
+              </a:lnSpc>
+              <a:spcBef>
+                <a:spcPts val="0"/>
+              </a:spcBef>
+              <a:spcAft>
+                <a:spcPts val="0"/>
+              </a:spcAft>
+              <a:buNone/>
+            </a:pPr>
+            <a:r>
+              <a:rPr lang="en" sz="1000" dirty="0" smtClean="0">
+                <a:solidFill>
+                  <a:schemeClr val="dk1"/>
+                </a:solidFill>
+                <a:latin typeface="Comfortaa Regular"/>
+                <a:ea typeface="Comfortaa Regular"/>
+                <a:cs typeface="Comfortaa Regular"/>
+                <a:sym typeface="Comfortaa Regular"/>
+              </a:rPr>
+              <a:t>( </a:t>
+            </a:r>
+            <a:r>
+              <a:rPr lang="en" sz="1000" dirty="0">
+                <a:solidFill>
+                  <a:schemeClr val="dk1"/>
+                </a:solidFill>
+                <a:latin typeface="Comfortaa Regular"/>
+                <a:ea typeface="Comfortaa Regular"/>
+                <a:cs typeface="Comfortaa Regular"/>
+                <a:sym typeface="Comfortaa Regular"/>
+              </a:rPr>
+              <a:t>já que vamos passar algumas semanas juntos). </a:t>
+            </a:r>
+            <a:endParaRPr sz="1000" b="1" dirty="0">
+              <a:solidFill>
+                <a:schemeClr val="dk1"/>
+              </a:solidFill>
+              <a:latin typeface="Comfortaa"/>
+              <a:ea typeface="Comfortaa"/>
+              <a:cs typeface="Comfortaa"/>
+              <a:sym typeface="Comfortaa"/>
+            </a:endParaRPr>
+          </a:p>
+          <a:p>
+            <a:pPr marL="0" lvl="0" indent="0" algn="l" rtl="0">
+              <a:lnSpc>
+                <a:spcPct val="200000"/>
+              </a:lnSpc>
+              <a:spcBef>
+                <a:spcPts val="0"/>
+              </a:spcBef>
+              <a:spcAft>
+                <a:spcPts val="0"/>
+              </a:spcAft>
+              <a:buNone/>
+            </a:pPr>
+            <a:endParaRPr sz="1000" b="1" dirty="0">
+              <a:solidFill>
+                <a:schemeClr val="dk1"/>
+              </a:solidFill>
+              <a:latin typeface="Comfortaa"/>
+              <a:ea typeface="Comfortaa"/>
+              <a:cs typeface="Comfortaa"/>
+              <a:sym typeface="Comfortaa"/>
+            </a:endParaRPr>
+          </a:p>
+          <a:p>
+            <a:pPr marL="0" lvl="0" indent="0" algn="l" rtl="0">
+              <a:lnSpc>
+                <a:spcPct val="200000"/>
+              </a:lnSpc>
+              <a:spcBef>
+                <a:spcPts val="0"/>
+              </a:spcBef>
+              <a:spcAft>
+                <a:spcPts val="0"/>
+              </a:spcAft>
+              <a:buNone/>
+            </a:pPr>
+            <a:r>
+              <a:rPr lang="en" sz="1000" dirty="0">
+                <a:solidFill>
+                  <a:schemeClr val="dk1"/>
+                </a:solidFill>
+                <a:latin typeface="Comfortaa Regular"/>
+                <a:ea typeface="Comfortaa Regular"/>
+                <a:cs typeface="Comfortaa Regular"/>
+                <a:sym typeface="Comfortaa Regular"/>
+              </a:rPr>
+              <a:t>        </a:t>
+            </a:r>
+            <a:endParaRPr sz="1000" dirty="0"/>
+          </a:p>
+        </p:txBody>
+      </p:sp>
+      <p:pic>
+        <p:nvPicPr>
+          <p:cNvPr id="179" name="Google Shape;179;p21"/>
+          <p:cNvPicPr preferRelativeResize="0"/>
+          <p:nvPr/>
+        </p:nvPicPr>
+        <p:blipFill>
+          <a:blip r:embed="rId4">
+            <a:alphaModFix/>
+          </a:blip>
+          <a:stretch>
+            <a:fillRect/>
+          </a:stretch>
+        </p:blipFill>
+        <p:spPr>
+          <a:xfrm>
+            <a:off x="3158175" y="3313800"/>
+            <a:ext cx="1005900" cy="1005900"/>
+          </a:xfrm>
+          <a:prstGeom prst="ellipse">
+            <a:avLst/>
+          </a:prstGeom>
+          <a:noFill/>
+          <a:ln w="9525" cap="flat" cmpd="sng">
+            <a:solidFill>
+              <a:srgbClr val="F6B26B"/>
+            </a:solidFill>
+            <a:prstDash val="solid"/>
+            <a:round/>
+            <a:headEnd type="none" w="sm" len="sm"/>
+            <a:tailEnd type="none" w="sm" len="sm"/>
+          </a:ln>
+        </p:spPr>
+      </p:pic>
+      <p:sp>
+        <p:nvSpPr>
+          <p:cNvPr id="180" name="Google Shape;180;p21"/>
+          <p:cNvSpPr txBox="1"/>
+          <p:nvPr/>
+        </p:nvSpPr>
+        <p:spPr>
+          <a:xfrm>
+            <a:off x="3090850" y="1489753"/>
+            <a:ext cx="5535600" cy="994984"/>
+          </a:xfrm>
+          <a:prstGeom prst="rect">
+            <a:avLst/>
+          </a:prstGeom>
+          <a:noFill/>
+          <a:ln>
+            <a:noFill/>
+          </a:ln>
+        </p:spPr>
+        <p:txBody>
+          <a:bodyPr spcFirstLastPara="1" wrap="square" lIns="91425" tIns="91425" rIns="91425" bIns="91425" anchor="t" anchorCtr="0">
+            <a:noAutofit/>
+          </a:bodyPr>
+          <a:lstStyle/>
+          <a:p>
+            <a:pPr marL="0" lvl="0" indent="0" algn="l" rtl="0">
+              <a:lnSpc>
+                <a:spcPct val="200000"/>
+              </a:lnSpc>
+              <a:spcBef>
+                <a:spcPts val="0"/>
+              </a:spcBef>
+              <a:spcAft>
+                <a:spcPts val="0"/>
+              </a:spcAft>
+              <a:buNone/>
+            </a:pPr>
+            <a:r>
+              <a:rPr lang="en" sz="1000" b="1" dirty="0">
+                <a:solidFill>
+                  <a:schemeClr val="dk1"/>
+                </a:solidFill>
+                <a:latin typeface="Comfortaa"/>
+                <a:ea typeface="Comfortaa"/>
+                <a:cs typeface="Comfortaa"/>
+                <a:sym typeface="Comfortaa"/>
+              </a:rPr>
+              <a:t>Qual nome de super heroi? </a:t>
+            </a:r>
+            <a:r>
+              <a:rPr lang="en" sz="1000" dirty="0">
+                <a:solidFill>
+                  <a:schemeClr val="dk1"/>
+                </a:solidFill>
+                <a:latin typeface="Comfortaa Regular"/>
+                <a:ea typeface="Comfortaa Regular"/>
+                <a:cs typeface="Comfortaa Regular"/>
+                <a:sym typeface="Comfortaa Regular"/>
+              </a:rPr>
+              <a:t>Pode inventar ou usar um existente blz!</a:t>
+            </a:r>
+            <a:endParaRPr sz="1000" dirty="0">
+              <a:solidFill>
+                <a:schemeClr val="dk1"/>
+              </a:solidFill>
+              <a:latin typeface="Comfortaa Regular"/>
+              <a:ea typeface="Comfortaa Regular"/>
+              <a:cs typeface="Comfortaa Regular"/>
+              <a:sym typeface="Comfortaa Regular"/>
+            </a:endParaRPr>
+          </a:p>
+          <a:p>
+            <a:pPr marL="0" lvl="0" indent="0" algn="l" rtl="0">
+              <a:lnSpc>
+                <a:spcPct val="200000"/>
+              </a:lnSpc>
+              <a:spcBef>
+                <a:spcPts val="0"/>
+              </a:spcBef>
+              <a:spcAft>
+                <a:spcPts val="0"/>
+              </a:spcAft>
+              <a:buNone/>
+            </a:pPr>
+            <a:r>
+              <a:rPr lang="en" sz="1000" b="1" dirty="0">
+                <a:solidFill>
+                  <a:schemeClr val="dk1"/>
+                </a:solidFill>
+                <a:latin typeface="Comfortaa"/>
+                <a:ea typeface="Comfortaa"/>
+                <a:cs typeface="Comfortaa"/>
+                <a:sym typeface="Comfortaa"/>
+              </a:rPr>
+              <a:t>Qual o seu poder? </a:t>
+            </a:r>
+            <a:endParaRPr sz="1000" b="1" dirty="0">
+              <a:solidFill>
+                <a:schemeClr val="dk1"/>
+              </a:solidFill>
+              <a:latin typeface="Comfortaa"/>
+              <a:ea typeface="Comfortaa"/>
+              <a:cs typeface="Comfortaa"/>
+              <a:sym typeface="Comfortaa"/>
+            </a:endParaRPr>
+          </a:p>
+          <a:p>
+            <a:pPr marL="0" lvl="0" indent="0" algn="l" rtl="0">
+              <a:lnSpc>
+                <a:spcPct val="200000"/>
+              </a:lnSpc>
+              <a:spcBef>
+                <a:spcPts val="0"/>
+              </a:spcBef>
+              <a:spcAft>
+                <a:spcPts val="0"/>
+              </a:spcAft>
+              <a:buNone/>
+            </a:pPr>
+            <a:r>
+              <a:rPr lang="en" sz="1000" b="1" dirty="0">
+                <a:solidFill>
+                  <a:schemeClr val="dk1"/>
+                </a:solidFill>
+                <a:latin typeface="Comfortaa"/>
+                <a:ea typeface="Comfortaa"/>
+                <a:cs typeface="Comfortaa"/>
+                <a:sym typeface="Comfortaa"/>
+              </a:rPr>
+              <a:t>Qual sua kriptonita ( fraqueza)?</a:t>
+            </a:r>
+            <a:endParaRPr dirty="0"/>
+          </a:p>
+        </p:txBody>
+      </p:sp>
+      <p:sp>
+        <p:nvSpPr>
+          <p:cNvPr id="181" name="Google Shape;181;p21"/>
+          <p:cNvSpPr txBox="1"/>
+          <p:nvPr/>
+        </p:nvSpPr>
+        <p:spPr>
+          <a:xfrm>
+            <a:off x="3363150" y="2571750"/>
+            <a:ext cx="4896600" cy="324000"/>
+          </a:xfrm>
+          <a:prstGeom prst="rect">
+            <a:avLst/>
+          </a:prstGeom>
+          <a:noFill/>
+          <a:ln>
+            <a:noFill/>
+          </a:ln>
+        </p:spPr>
+        <p:txBody>
+          <a:bodyPr spcFirstLastPara="1" wrap="square" lIns="91425" tIns="91425" rIns="91425" bIns="91425" anchor="t" anchorCtr="0">
+            <a:noAutofit/>
+          </a:bodyPr>
+          <a:lstStyle/>
+          <a:p>
+            <a:pPr marL="0" lvl="0" indent="0" algn="l" rtl="0">
+              <a:lnSpc>
+                <a:spcPct val="200000"/>
+              </a:lnSpc>
+              <a:spcBef>
+                <a:spcPts val="0"/>
+              </a:spcBef>
+              <a:spcAft>
+                <a:spcPts val="0"/>
+              </a:spcAft>
+              <a:buNone/>
+            </a:pPr>
+            <a:r>
+              <a:rPr lang="en" b="1" dirty="0">
+                <a:solidFill>
+                  <a:schemeClr val="dk1"/>
+                </a:solidFill>
+                <a:latin typeface="Comfortaa"/>
+                <a:ea typeface="Comfortaa"/>
+                <a:cs typeface="Comfortaa"/>
+                <a:sym typeface="Comfortaa"/>
+              </a:rPr>
+              <a:t>"Quem você seria se fosse super herói? " </a:t>
+            </a:r>
+            <a:endParaRPr sz="1200" b="1" dirty="0">
+              <a:solidFill>
+                <a:schemeClr val="dk1"/>
+              </a:solidFill>
+              <a:latin typeface="Comfortaa"/>
+              <a:ea typeface="Comfortaa"/>
+              <a:cs typeface="Comfortaa"/>
+              <a:sym typeface="Comfortaa"/>
+            </a:endParaRPr>
+          </a:p>
+          <a:p>
+            <a:pPr marL="0" lvl="0" indent="0" algn="l" rtl="0">
+              <a:lnSpc>
+                <a:spcPct val="200000"/>
+              </a:lnSpc>
+              <a:spcBef>
+                <a:spcPts val="0"/>
+              </a:spcBef>
+              <a:spcAft>
+                <a:spcPts val="0"/>
+              </a:spcAft>
+              <a:buNone/>
+            </a:pPr>
+            <a:endParaRPr sz="1700" b="1" dirty="0">
+              <a:solidFill>
+                <a:schemeClr val="dk1"/>
+              </a:solidFill>
+              <a:latin typeface="Comfortaa"/>
+              <a:ea typeface="Comfortaa"/>
+              <a:cs typeface="Comfortaa"/>
+              <a:sym typeface="Comfortaa"/>
+            </a:endParaRPr>
+          </a:p>
+        </p:txBody>
+      </p:sp>
+      <p:sp>
+        <p:nvSpPr>
+          <p:cNvPr id="182" name="Google Shape;182;p21"/>
+          <p:cNvSpPr txBox="1"/>
+          <p:nvPr/>
+        </p:nvSpPr>
+        <p:spPr>
+          <a:xfrm>
+            <a:off x="4555900" y="3313800"/>
+            <a:ext cx="3915900" cy="1073400"/>
+          </a:xfrm>
+          <a:prstGeom prst="rect">
+            <a:avLst/>
+          </a:prstGeom>
+          <a:noFill/>
+          <a:ln>
+            <a:noFill/>
+          </a:ln>
+        </p:spPr>
+        <p:txBody>
+          <a:bodyPr spcFirstLastPara="1" wrap="square" lIns="91425" tIns="91425" rIns="91425" bIns="91425" anchor="t" anchorCtr="0">
+            <a:noAutofit/>
+          </a:bodyPr>
+          <a:lstStyle/>
+          <a:p>
+            <a:pPr marL="0" lvl="0" indent="0" algn="l" rtl="0">
+              <a:lnSpc>
+                <a:spcPct val="200000"/>
+              </a:lnSpc>
+              <a:spcBef>
+                <a:spcPts val="0"/>
+              </a:spcBef>
+              <a:spcAft>
+                <a:spcPts val="0"/>
+              </a:spcAft>
+              <a:buNone/>
+            </a:pPr>
+            <a:r>
+              <a:rPr lang="en" sz="1100" b="1" dirty="0">
+                <a:solidFill>
+                  <a:schemeClr val="dk1"/>
+                </a:solidFill>
+                <a:latin typeface="Comfortaa"/>
+                <a:ea typeface="Comfortaa"/>
+                <a:cs typeface="Comfortaa"/>
+                <a:sym typeface="Comfortaa"/>
+              </a:rPr>
+              <a:t>MiuraSan</a:t>
+            </a:r>
+            <a:endParaRPr sz="1100" b="1" dirty="0">
+              <a:solidFill>
+                <a:schemeClr val="dk1"/>
+              </a:solidFill>
+              <a:latin typeface="Comfortaa"/>
+              <a:ea typeface="Comfortaa"/>
+              <a:cs typeface="Comfortaa"/>
+              <a:sym typeface="Comfortaa"/>
+            </a:endParaRPr>
+          </a:p>
+          <a:p>
+            <a:pPr marL="0" lvl="0" indent="0" algn="l" rtl="0">
+              <a:lnSpc>
+                <a:spcPct val="200000"/>
+              </a:lnSpc>
+              <a:spcBef>
+                <a:spcPts val="0"/>
+              </a:spcBef>
+              <a:spcAft>
+                <a:spcPts val="0"/>
+              </a:spcAft>
+              <a:buNone/>
+            </a:pPr>
+            <a:r>
+              <a:rPr lang="en" sz="1000" b="1" dirty="0">
+                <a:solidFill>
+                  <a:schemeClr val="dk1"/>
+                </a:solidFill>
+                <a:latin typeface="Comfortaa"/>
+                <a:ea typeface="Comfortaa"/>
+                <a:cs typeface="Comfortaa"/>
+                <a:sym typeface="Comfortaa"/>
+              </a:rPr>
+              <a:t>Poder: </a:t>
+            </a:r>
+            <a:r>
+              <a:rPr lang="en" sz="1000" dirty="0">
+                <a:solidFill>
+                  <a:schemeClr val="dk1"/>
+                </a:solidFill>
+                <a:latin typeface="Comfortaa Regular"/>
+                <a:ea typeface="Comfortaa Regular"/>
+                <a:cs typeface="Comfortaa Regular"/>
+                <a:sym typeface="Comfortaa Regular"/>
+              </a:rPr>
+              <a:t>Aptidão intuitiva, </a:t>
+            </a:r>
+            <a:r>
+              <a:rPr lang="en" sz="1000" dirty="0">
+                <a:solidFill>
+                  <a:schemeClr val="dk1"/>
+                </a:solidFill>
+                <a:highlight>
+                  <a:srgbClr val="FFFFFF"/>
+                </a:highlight>
+                <a:latin typeface="Comfortaa Regular"/>
+                <a:ea typeface="Comfortaa Regular"/>
+                <a:cs typeface="Comfortaa Regular"/>
+                <a:sym typeface="Comfortaa Regular"/>
+              </a:rPr>
+              <a:t>Duplicação</a:t>
+            </a:r>
+            <a:endParaRPr sz="1000" dirty="0">
+              <a:solidFill>
+                <a:schemeClr val="dk1"/>
+              </a:solidFill>
+              <a:latin typeface="Comfortaa Regular"/>
+              <a:ea typeface="Comfortaa Regular"/>
+              <a:cs typeface="Comfortaa Regular"/>
+              <a:sym typeface="Comfortaa Regular"/>
+            </a:endParaRPr>
+          </a:p>
+          <a:p>
+            <a:pPr marL="0" lvl="0" indent="0" algn="l" rtl="0">
+              <a:lnSpc>
+                <a:spcPct val="200000"/>
+              </a:lnSpc>
+              <a:spcBef>
+                <a:spcPts val="0"/>
+              </a:spcBef>
+              <a:spcAft>
+                <a:spcPts val="0"/>
+              </a:spcAft>
+              <a:buNone/>
+            </a:pPr>
+            <a:r>
+              <a:rPr lang="en" sz="1000" b="1" dirty="0">
+                <a:solidFill>
+                  <a:schemeClr val="dk1"/>
+                </a:solidFill>
+                <a:latin typeface="Comfortaa"/>
+                <a:ea typeface="Comfortaa"/>
+                <a:cs typeface="Comfortaa"/>
+                <a:sym typeface="Comfortaa"/>
+              </a:rPr>
+              <a:t>Kriptonita: </a:t>
+            </a:r>
+            <a:r>
+              <a:rPr lang="en" sz="1000" dirty="0">
+                <a:solidFill>
+                  <a:schemeClr val="dk1"/>
+                </a:solidFill>
+                <a:latin typeface="Comfortaa Regular"/>
+                <a:ea typeface="Comfortaa Regular"/>
+                <a:cs typeface="Comfortaa Regular"/>
+                <a:sym typeface="Comfortaa Regular"/>
+              </a:rPr>
+              <a:t>Falta de confiança ( minha namorada tbm )</a:t>
+            </a:r>
+            <a:endParaRPr sz="1000" dirty="0">
+              <a:solidFill>
+                <a:schemeClr val="dk1"/>
+              </a:solidFill>
+              <a:latin typeface="Comfortaa Regular"/>
+              <a:ea typeface="Comfortaa Regular"/>
+              <a:cs typeface="Comfortaa Regular"/>
+              <a:sym typeface="Comfortaa Regular"/>
+            </a:endParaRPr>
+          </a:p>
+          <a:p>
+            <a:pPr marL="0" lvl="0" indent="0" algn="l" rtl="0">
+              <a:lnSpc>
+                <a:spcPct val="200000"/>
+              </a:lnSpc>
+              <a:spcBef>
+                <a:spcPts val="0"/>
+              </a:spcBef>
+              <a:spcAft>
+                <a:spcPts val="0"/>
+              </a:spcAft>
+              <a:buNone/>
+            </a:pPr>
+            <a:endParaRPr dirty="0"/>
+          </a:p>
+        </p:txBody>
+      </p:sp>
+      <p:sp>
+        <p:nvSpPr>
+          <p:cNvPr id="183" name="Google Shape;183;p21"/>
+          <p:cNvSpPr txBox="1"/>
+          <p:nvPr/>
+        </p:nvSpPr>
+        <p:spPr>
+          <a:xfrm>
+            <a:off x="8412750" y="4697175"/>
+            <a:ext cx="611100" cy="378300"/>
+          </a:xfrm>
+          <a:prstGeom prst="rect">
+            <a:avLst/>
+          </a:prstGeom>
+          <a:noFill/>
+          <a:ln>
+            <a:noFill/>
+          </a:ln>
+        </p:spPr>
+        <p:txBody>
+          <a:bodyPr spcFirstLastPara="1" wrap="square" lIns="91425" tIns="91425" rIns="91425" bIns="91425" anchor="t" anchorCtr="0">
+            <a:noAutofit/>
+          </a:bodyPr>
+          <a:lstStyle/>
+          <a:p>
+            <a:pPr marL="0" lvl="0" indent="0" algn="r" rtl="0">
+              <a:lnSpc>
+                <a:spcPct val="150000"/>
+              </a:lnSpc>
+              <a:spcBef>
+                <a:spcPts val="0"/>
+              </a:spcBef>
+              <a:spcAft>
+                <a:spcPts val="0"/>
+              </a:spcAft>
+              <a:buNone/>
+            </a:pPr>
+            <a:r>
+              <a:rPr lang="en" sz="1000">
+                <a:solidFill>
+                  <a:schemeClr val="dk1"/>
+                </a:solidFill>
+                <a:latin typeface="Comfortaa Regular"/>
+                <a:ea typeface="Comfortaa Regular"/>
+                <a:cs typeface="Comfortaa Regular"/>
+                <a:sym typeface="Comfortaa Regular"/>
+              </a:rPr>
+              <a:t>10/10</a:t>
+            </a:r>
+            <a:endParaRPr sz="1000">
+              <a:solidFill>
+                <a:schemeClr val="dk1"/>
+              </a:solidFill>
+              <a:latin typeface="Comfortaa Regular"/>
+              <a:ea typeface="Comfortaa Regular"/>
+              <a:cs typeface="Comfortaa Regular"/>
+              <a:sym typeface="Comfortaa Regular"/>
+            </a:endParaRPr>
+          </a:p>
+          <a:p>
+            <a:pPr marL="0" lvl="0" indent="0" algn="r" rtl="0">
+              <a:spcBef>
+                <a:spcPts val="0"/>
+              </a:spcBef>
+              <a:spcAft>
+                <a:spcPts val="0"/>
+              </a:spcAft>
+              <a:buNone/>
+            </a:pPr>
+            <a:endParaRPr sz="1000">
+              <a:solidFill>
+                <a:schemeClr val="dk1"/>
+              </a:solidFill>
+              <a:latin typeface="Comfortaa Regular"/>
+              <a:ea typeface="Comfortaa Regular"/>
+              <a:cs typeface="Comfortaa Regular"/>
+              <a:sym typeface="Comfortaa Regular"/>
+            </a:endParaRPr>
+          </a:p>
+        </p:txBody>
+      </p:sp>
+    </p:spTree>
+  </p:cSld>
+  <p:clrMapOvr>
+    <a:masterClrMapping/>
+  </p:clrMapOvr>
+  <p:timing>
+    <p:tnLst>
+      <p:par>
+        <p:cTn id="1" dur="indefinite" restart="never" nodeType="tmRoot"/>
+      </p:par>
+    </p:tnLst>
+  </p:timing>
+</p:sld>
+</file>
+
+<file path=ppt/slides/slide8.xml><?xml version="1.0" encoding="utf-8"?>
 <p:sld xmlns:a="http://schemas.openxmlformats.org/drawingml/2006/main" xmlns:r="http://schemas.openxmlformats.org/officeDocument/2006/relationships" xmlns:p="http://schemas.openxmlformats.org/presentationml/2006/main">
   <p:cSld>
     <p:spTree>
@@ -13369,7 +14152,7 @@
 </p:sld>
 </file>
 
-<file path=ppt/slides/slide8.xml><?xml version="1.0" encoding="utf-8"?>
+<file path=ppt/slides/slide9.xml><?xml version="1.0" encoding="utf-8"?>
 <p:sld xmlns:a="http://schemas.openxmlformats.org/drawingml/2006/main" xmlns:r="http://schemas.openxmlformats.org/officeDocument/2006/relationships" xmlns:p="http://schemas.openxmlformats.org/presentationml/2006/main">
   <p:cSld>
     <p:spTree>
@@ -13662,856 +14445,6 @@
                 <a:sym typeface="Comfortaa Regular"/>
               </a:rPr>
               <a:t>9/10</a:t>
-            </a:r>
-            <a:endParaRPr sz="1000">
-              <a:solidFill>
-                <a:schemeClr val="dk1"/>
-              </a:solidFill>
-              <a:latin typeface="Comfortaa Regular"/>
-              <a:ea typeface="Comfortaa Regular"/>
-              <a:cs typeface="Comfortaa Regular"/>
-              <a:sym typeface="Comfortaa Regular"/>
-            </a:endParaRPr>
-          </a:p>
-          <a:p>
-            <a:pPr marL="0" lvl="0" indent="0" algn="r" rtl="0">
-              <a:spcBef>
-                <a:spcPts val="0"/>
-              </a:spcBef>
-              <a:spcAft>
-                <a:spcPts val="0"/>
-              </a:spcAft>
-              <a:buNone/>
-            </a:pPr>
-            <a:endParaRPr sz="1000">
-              <a:solidFill>
-                <a:schemeClr val="dk1"/>
-              </a:solidFill>
-              <a:latin typeface="Comfortaa Regular"/>
-              <a:ea typeface="Comfortaa Regular"/>
-              <a:cs typeface="Comfortaa Regular"/>
-              <a:sym typeface="Comfortaa Regular"/>
-            </a:endParaRPr>
-          </a:p>
-        </p:txBody>
-      </p:sp>
-    </p:spTree>
-  </p:cSld>
-  <p:clrMapOvr>
-    <a:masterClrMapping/>
-  </p:clrMapOvr>
-  <p:timing>
-    <p:tnLst>
-      <p:par>
-        <p:cTn id="1" dur="indefinite" restart="never" nodeType="tmRoot"/>
-      </p:par>
-    </p:tnLst>
-  </p:timing>
-</p:sld>
-</file>
-
-<file path=ppt/slides/slide9.xml><?xml version="1.0" encoding="utf-8"?>
-<p:sld xmlns:a="http://schemas.openxmlformats.org/drawingml/2006/main" xmlns:r="http://schemas.openxmlformats.org/officeDocument/2006/relationships" xmlns:p="http://schemas.openxmlformats.org/presentationml/2006/main">
-  <p:cSld>
-    <p:spTree>
-      <p:nvGrpSpPr>
-        <p:cNvPr id="1" name="Shape 173"/>
-        <p:cNvGrpSpPr/>
-        <p:nvPr/>
-      </p:nvGrpSpPr>
-      <p:grpSpPr>
-        <a:xfrm>
-          <a:off x="0" y="0"/>
-          <a:ext cx="0" cy="0"/>
-          <a:chOff x="0" y="0"/>
-          <a:chExt cx="0" cy="0"/>
-        </a:xfrm>
-      </p:grpSpPr>
-      <p:pic>
-        <p:nvPicPr>
-          <p:cNvPr id="174" name="Google Shape;174;p21"/>
-          <p:cNvPicPr preferRelativeResize="0"/>
-          <p:nvPr/>
-        </p:nvPicPr>
-        <p:blipFill rotWithShape="1">
-          <a:blip r:embed="rId3">
-            <a:alphaModFix/>
-          </a:blip>
-          <a:srcRect l="13057" r="39409"/>
-          <a:stretch/>
-        </p:blipFill>
-        <p:spPr>
-          <a:xfrm>
-            <a:off x="0" y="0"/>
-            <a:ext cx="2533499" cy="5174700"/>
-          </a:xfrm>
-          <a:prstGeom prst="rect">
-            <a:avLst/>
-          </a:prstGeom>
-          <a:noFill/>
-          <a:ln>
-            <a:noFill/>
-          </a:ln>
-        </p:spPr>
-      </p:pic>
-      <p:sp>
-        <p:nvSpPr>
-          <p:cNvPr id="175" name="Google Shape;175;p21"/>
-          <p:cNvSpPr/>
-          <p:nvPr/>
-        </p:nvSpPr>
-        <p:spPr>
-          <a:xfrm flipH="1">
-            <a:off x="0" y="0"/>
-            <a:ext cx="2533500" cy="5174700"/>
-          </a:xfrm>
-          <a:prstGeom prst="rect">
-            <a:avLst/>
-          </a:prstGeom>
-          <a:solidFill>
-            <a:srgbClr val="000000">
-              <a:alpha val="34080"/>
-            </a:srgbClr>
-          </a:solidFill>
-          <a:ln>
-            <a:noFill/>
-          </a:ln>
-        </p:spPr>
-        <p:txBody>
-          <a:bodyPr spcFirstLastPara="1" wrap="square" lIns="91425" tIns="91425" rIns="91425" bIns="91425" anchor="ctr" anchorCtr="0">
-            <a:noAutofit/>
-          </a:bodyPr>
-          <a:lstStyle/>
-          <a:p>
-            <a:pPr marL="0" lvl="0" indent="0" algn="l" rtl="0">
-              <a:spcBef>
-                <a:spcPts val="0"/>
-              </a:spcBef>
-              <a:spcAft>
-                <a:spcPts val="0"/>
-              </a:spcAft>
-              <a:buNone/>
-            </a:pPr>
-            <a:endParaRPr/>
-          </a:p>
-        </p:txBody>
-      </p:sp>
-      <p:sp>
-        <p:nvSpPr>
-          <p:cNvPr id="176" name="Google Shape;176;p21"/>
-          <p:cNvSpPr txBox="1"/>
-          <p:nvPr/>
-        </p:nvSpPr>
-        <p:spPr>
-          <a:xfrm>
-            <a:off x="66300" y="391475"/>
-            <a:ext cx="2400900" cy="2324400"/>
-          </a:xfrm>
-          <a:prstGeom prst="rect">
-            <a:avLst/>
-          </a:prstGeom>
-          <a:noFill/>
-          <a:ln>
-            <a:noFill/>
-          </a:ln>
-        </p:spPr>
-        <p:txBody>
-          <a:bodyPr spcFirstLastPara="1" wrap="square" lIns="91425" tIns="91425" rIns="91425" bIns="91425" anchor="t" anchorCtr="0">
-            <a:noAutofit/>
-          </a:bodyPr>
-          <a:lstStyle/>
-          <a:p>
-            <a:pPr marL="0" lvl="0" indent="0" algn="l" rtl="0">
-              <a:lnSpc>
-                <a:spcPct val="115000"/>
-              </a:lnSpc>
-              <a:spcBef>
-                <a:spcPts val="0"/>
-              </a:spcBef>
-              <a:spcAft>
-                <a:spcPts val="0"/>
-              </a:spcAft>
-              <a:buNone/>
-            </a:pPr>
-            <a:r>
-              <a:rPr lang="en" sz="3200" b="1" dirty="0">
-                <a:solidFill>
-                  <a:schemeClr val="lt1"/>
-                </a:solidFill>
-                <a:latin typeface="Comfortaa"/>
-                <a:ea typeface="Comfortaa"/>
-                <a:cs typeface="Comfortaa"/>
-                <a:sym typeface="Comfortaa"/>
-              </a:rPr>
-              <a:t>Quais seriam seus poderes? </a:t>
-            </a:r>
-            <a:endParaRPr sz="3900" b="1" dirty="0">
-              <a:solidFill>
-                <a:schemeClr val="lt1"/>
-              </a:solidFill>
-              <a:latin typeface="Comfortaa"/>
-              <a:ea typeface="Comfortaa"/>
-              <a:cs typeface="Comfortaa"/>
-              <a:sym typeface="Comfortaa"/>
-            </a:endParaRPr>
-          </a:p>
-        </p:txBody>
-      </p:sp>
-      <p:sp>
-        <p:nvSpPr>
-          <p:cNvPr id="177" name="Google Shape;177;p21"/>
-          <p:cNvSpPr txBox="1"/>
-          <p:nvPr/>
-        </p:nvSpPr>
-        <p:spPr>
-          <a:xfrm>
-            <a:off x="3090850" y="224600"/>
-            <a:ext cx="4084800" cy="505200"/>
-          </a:xfrm>
-          <a:prstGeom prst="rect">
-            <a:avLst/>
-          </a:prstGeom>
-          <a:noFill/>
-          <a:ln>
-            <a:noFill/>
-          </a:ln>
-        </p:spPr>
-        <p:txBody>
-          <a:bodyPr spcFirstLastPara="1" wrap="square" lIns="91425" tIns="91425" rIns="91425" bIns="91425" anchor="t" anchorCtr="0">
-            <a:noAutofit/>
-          </a:bodyPr>
-          <a:lstStyle/>
-          <a:p>
-            <a:pPr marL="0" lvl="0" indent="0" algn="l" rtl="0">
-              <a:spcBef>
-                <a:spcPts val="0"/>
-              </a:spcBef>
-              <a:spcAft>
-                <a:spcPts val="0"/>
-              </a:spcAft>
-              <a:buNone/>
-            </a:pPr>
-            <a:r>
-              <a:rPr lang="en" sz="2000" b="1">
-                <a:solidFill>
-                  <a:schemeClr val="dk1"/>
-                </a:solidFill>
-                <a:latin typeface="Comfortaa"/>
-                <a:ea typeface="Comfortaa"/>
-                <a:cs typeface="Comfortaa"/>
-                <a:sym typeface="Comfortaa"/>
-              </a:rPr>
-              <a:t>Quebra gelo!</a:t>
-            </a:r>
-            <a:endParaRPr sz="2000" b="1">
-              <a:solidFill>
-                <a:schemeClr val="dk1"/>
-              </a:solidFill>
-              <a:latin typeface="Comfortaa"/>
-              <a:ea typeface="Comfortaa"/>
-              <a:cs typeface="Comfortaa"/>
-              <a:sym typeface="Comfortaa"/>
-            </a:endParaRPr>
-          </a:p>
-        </p:txBody>
-      </p:sp>
-      <p:sp>
-        <p:nvSpPr>
-          <p:cNvPr id="178" name="Google Shape;178;p21"/>
-          <p:cNvSpPr txBox="1"/>
-          <p:nvPr/>
-        </p:nvSpPr>
-        <p:spPr>
-          <a:xfrm>
-            <a:off x="3090850" y="698525"/>
-            <a:ext cx="5827200" cy="693300"/>
-          </a:xfrm>
-          <a:prstGeom prst="rect">
-            <a:avLst/>
-          </a:prstGeom>
-          <a:noFill/>
-          <a:ln>
-            <a:noFill/>
-          </a:ln>
-        </p:spPr>
-        <p:txBody>
-          <a:bodyPr spcFirstLastPara="1" wrap="square" lIns="91425" tIns="91425" rIns="91425" bIns="91425" anchor="t" anchorCtr="0">
-            <a:noAutofit/>
-          </a:bodyPr>
-          <a:lstStyle/>
-          <a:p>
-            <a:pPr marL="0" lvl="0" indent="0" algn="l" rtl="0">
-              <a:lnSpc>
-                <a:spcPct val="200000"/>
-              </a:lnSpc>
-              <a:spcBef>
-                <a:spcPts val="0"/>
-              </a:spcBef>
-              <a:spcAft>
-                <a:spcPts val="0"/>
-              </a:spcAft>
-              <a:buNone/>
-            </a:pPr>
-            <a:r>
-              <a:rPr lang="en" sz="1000">
-                <a:solidFill>
-                  <a:schemeClr val="dk1"/>
-                </a:solidFill>
-                <a:latin typeface="Comfortaa Regular"/>
-                <a:ea typeface="Comfortaa Regular"/>
-                <a:cs typeface="Comfortaa Regular"/>
-                <a:sym typeface="Comfortaa Regular"/>
-              </a:rPr>
-              <a:t>Para nos conhecermos melhor, vamos fazer uma dinâmica de Team Building ( já que vamos passar algumas semanas juntos). </a:t>
-            </a:r>
-            <a:endParaRPr sz="1000" b="1">
-              <a:solidFill>
-                <a:schemeClr val="dk1"/>
-              </a:solidFill>
-              <a:latin typeface="Comfortaa"/>
-              <a:ea typeface="Comfortaa"/>
-              <a:cs typeface="Comfortaa"/>
-              <a:sym typeface="Comfortaa"/>
-            </a:endParaRPr>
-          </a:p>
-          <a:p>
-            <a:pPr marL="0" lvl="0" indent="0" algn="l" rtl="0">
-              <a:lnSpc>
-                <a:spcPct val="200000"/>
-              </a:lnSpc>
-              <a:spcBef>
-                <a:spcPts val="0"/>
-              </a:spcBef>
-              <a:spcAft>
-                <a:spcPts val="0"/>
-              </a:spcAft>
-              <a:buNone/>
-            </a:pPr>
-            <a:endParaRPr sz="1000" b="1">
-              <a:solidFill>
-                <a:schemeClr val="dk1"/>
-              </a:solidFill>
-              <a:latin typeface="Comfortaa"/>
-              <a:ea typeface="Comfortaa"/>
-              <a:cs typeface="Comfortaa"/>
-              <a:sym typeface="Comfortaa"/>
-            </a:endParaRPr>
-          </a:p>
-          <a:p>
-            <a:pPr marL="0" lvl="0" indent="0" algn="l" rtl="0">
-              <a:lnSpc>
-                <a:spcPct val="200000"/>
-              </a:lnSpc>
-              <a:spcBef>
-                <a:spcPts val="0"/>
-              </a:spcBef>
-              <a:spcAft>
-                <a:spcPts val="0"/>
-              </a:spcAft>
-              <a:buNone/>
-            </a:pPr>
-            <a:r>
-              <a:rPr lang="en" sz="1000">
-                <a:solidFill>
-                  <a:schemeClr val="dk1"/>
-                </a:solidFill>
-                <a:latin typeface="Comfortaa Regular"/>
-                <a:ea typeface="Comfortaa Regular"/>
-                <a:cs typeface="Comfortaa Regular"/>
-                <a:sym typeface="Comfortaa Regular"/>
-              </a:rPr>
-              <a:t>        </a:t>
-            </a:r>
-            <a:endParaRPr sz="1000"/>
-          </a:p>
-        </p:txBody>
-      </p:sp>
-      <p:pic>
-        <p:nvPicPr>
-          <p:cNvPr id="179" name="Google Shape;179;p21"/>
-          <p:cNvPicPr preferRelativeResize="0"/>
-          <p:nvPr/>
-        </p:nvPicPr>
-        <p:blipFill>
-          <a:blip r:embed="rId4">
-            <a:alphaModFix/>
-          </a:blip>
-          <a:stretch>
-            <a:fillRect/>
-          </a:stretch>
-        </p:blipFill>
-        <p:spPr>
-          <a:xfrm>
-            <a:off x="3158175" y="3313800"/>
-            <a:ext cx="1005900" cy="1005900"/>
-          </a:xfrm>
-          <a:prstGeom prst="ellipse">
-            <a:avLst/>
-          </a:prstGeom>
-          <a:noFill/>
-          <a:ln w="9525" cap="flat" cmpd="sng">
-            <a:solidFill>
-              <a:srgbClr val="F6B26B"/>
-            </a:solidFill>
-            <a:prstDash val="solid"/>
-            <a:round/>
-            <a:headEnd type="none" w="sm" len="sm"/>
-            <a:tailEnd type="none" w="sm" len="sm"/>
-          </a:ln>
-        </p:spPr>
-      </p:pic>
-      <p:sp>
-        <p:nvSpPr>
-          <p:cNvPr id="180" name="Google Shape;180;p21"/>
-          <p:cNvSpPr txBox="1"/>
-          <p:nvPr/>
-        </p:nvSpPr>
-        <p:spPr>
-          <a:xfrm>
-            <a:off x="3090850" y="1391825"/>
-            <a:ext cx="5535600" cy="1005900"/>
-          </a:xfrm>
-          <a:prstGeom prst="rect">
-            <a:avLst/>
-          </a:prstGeom>
-          <a:noFill/>
-          <a:ln>
-            <a:noFill/>
-          </a:ln>
-        </p:spPr>
-        <p:txBody>
-          <a:bodyPr spcFirstLastPara="1" wrap="square" lIns="91425" tIns="91425" rIns="91425" bIns="91425" anchor="t" anchorCtr="0">
-            <a:noAutofit/>
-          </a:bodyPr>
-          <a:lstStyle/>
-          <a:p>
-            <a:pPr marL="0" lvl="0" indent="0" algn="l" rtl="0">
-              <a:lnSpc>
-                <a:spcPct val="200000"/>
-              </a:lnSpc>
-              <a:spcBef>
-                <a:spcPts val="0"/>
-              </a:spcBef>
-              <a:spcAft>
-                <a:spcPts val="0"/>
-              </a:spcAft>
-              <a:buNone/>
-            </a:pPr>
-            <a:r>
-              <a:rPr lang="en" sz="1000" b="1">
-                <a:solidFill>
-                  <a:schemeClr val="dk1"/>
-                </a:solidFill>
-                <a:latin typeface="Comfortaa"/>
-                <a:ea typeface="Comfortaa"/>
-                <a:cs typeface="Comfortaa"/>
-                <a:sym typeface="Comfortaa"/>
-              </a:rPr>
-              <a:t>Qual nome de super heroi? </a:t>
-            </a:r>
-            <a:r>
-              <a:rPr lang="en" sz="1000">
-                <a:solidFill>
-                  <a:schemeClr val="dk1"/>
-                </a:solidFill>
-                <a:latin typeface="Comfortaa Regular"/>
-                <a:ea typeface="Comfortaa Regular"/>
-                <a:cs typeface="Comfortaa Regular"/>
-                <a:sym typeface="Comfortaa Regular"/>
-              </a:rPr>
-              <a:t>Pode inventar ou usar um existente blz!</a:t>
-            </a:r>
-            <a:endParaRPr sz="1000">
-              <a:solidFill>
-                <a:schemeClr val="dk1"/>
-              </a:solidFill>
-              <a:latin typeface="Comfortaa Regular"/>
-              <a:ea typeface="Comfortaa Regular"/>
-              <a:cs typeface="Comfortaa Regular"/>
-              <a:sym typeface="Comfortaa Regular"/>
-            </a:endParaRPr>
-          </a:p>
-          <a:p>
-            <a:pPr marL="0" lvl="0" indent="0" algn="l" rtl="0">
-              <a:lnSpc>
-                <a:spcPct val="200000"/>
-              </a:lnSpc>
-              <a:spcBef>
-                <a:spcPts val="0"/>
-              </a:spcBef>
-              <a:spcAft>
-                <a:spcPts val="0"/>
-              </a:spcAft>
-              <a:buNone/>
-            </a:pPr>
-            <a:r>
-              <a:rPr lang="en" sz="1000" b="1">
-                <a:solidFill>
-                  <a:schemeClr val="dk1"/>
-                </a:solidFill>
-                <a:latin typeface="Comfortaa"/>
-                <a:ea typeface="Comfortaa"/>
-                <a:cs typeface="Comfortaa"/>
-                <a:sym typeface="Comfortaa"/>
-              </a:rPr>
-              <a:t>Qual o seu poder? </a:t>
-            </a:r>
-            <a:endParaRPr sz="1000" b="1">
-              <a:solidFill>
-                <a:schemeClr val="dk1"/>
-              </a:solidFill>
-              <a:latin typeface="Comfortaa"/>
-              <a:ea typeface="Comfortaa"/>
-              <a:cs typeface="Comfortaa"/>
-              <a:sym typeface="Comfortaa"/>
-            </a:endParaRPr>
-          </a:p>
-          <a:p>
-            <a:pPr marL="0" lvl="0" indent="0" algn="l" rtl="0">
-              <a:lnSpc>
-                <a:spcPct val="200000"/>
-              </a:lnSpc>
-              <a:spcBef>
-                <a:spcPts val="0"/>
-              </a:spcBef>
-              <a:spcAft>
-                <a:spcPts val="0"/>
-              </a:spcAft>
-              <a:buNone/>
-            </a:pPr>
-            <a:r>
-              <a:rPr lang="en" sz="1000" b="1">
-                <a:solidFill>
-                  <a:schemeClr val="dk1"/>
-                </a:solidFill>
-                <a:latin typeface="Comfortaa"/>
-                <a:ea typeface="Comfortaa"/>
-                <a:cs typeface="Comfortaa"/>
-                <a:sym typeface="Comfortaa"/>
-              </a:rPr>
-              <a:t>Qual sua kriptonita ( fraqueza)?</a:t>
-            </a:r>
-            <a:endParaRPr/>
-          </a:p>
-        </p:txBody>
-      </p:sp>
-      <p:sp>
-        <p:nvSpPr>
-          <p:cNvPr id="181" name="Google Shape;181;p21"/>
-          <p:cNvSpPr txBox="1"/>
-          <p:nvPr/>
-        </p:nvSpPr>
-        <p:spPr>
-          <a:xfrm>
-            <a:off x="3363150" y="2571750"/>
-            <a:ext cx="4896600" cy="324000"/>
-          </a:xfrm>
-          <a:prstGeom prst="rect">
-            <a:avLst/>
-          </a:prstGeom>
-          <a:noFill/>
-          <a:ln>
-            <a:noFill/>
-          </a:ln>
-        </p:spPr>
-        <p:txBody>
-          <a:bodyPr spcFirstLastPara="1" wrap="square" lIns="91425" tIns="91425" rIns="91425" bIns="91425" anchor="t" anchorCtr="0">
-            <a:noAutofit/>
-          </a:bodyPr>
-          <a:lstStyle/>
-          <a:p>
-            <a:pPr marL="0" lvl="0" indent="0" algn="l" rtl="0">
-              <a:lnSpc>
-                <a:spcPct val="200000"/>
-              </a:lnSpc>
-              <a:spcBef>
-                <a:spcPts val="0"/>
-              </a:spcBef>
-              <a:spcAft>
-                <a:spcPts val="0"/>
-              </a:spcAft>
-              <a:buNone/>
-            </a:pPr>
-            <a:r>
-              <a:rPr lang="en" b="1">
-                <a:solidFill>
-                  <a:schemeClr val="dk1"/>
-                </a:solidFill>
-                <a:latin typeface="Comfortaa"/>
-                <a:ea typeface="Comfortaa"/>
-                <a:cs typeface="Comfortaa"/>
-                <a:sym typeface="Comfortaa"/>
-              </a:rPr>
-              <a:t>"Quem você seria se fosse super herói? " </a:t>
-            </a:r>
-            <a:endParaRPr sz="1200" b="1">
-              <a:solidFill>
-                <a:schemeClr val="dk1"/>
-              </a:solidFill>
-              <a:latin typeface="Comfortaa"/>
-              <a:ea typeface="Comfortaa"/>
-              <a:cs typeface="Comfortaa"/>
-              <a:sym typeface="Comfortaa"/>
-            </a:endParaRPr>
-          </a:p>
-          <a:p>
-            <a:pPr marL="0" lvl="0" indent="0" algn="l" rtl="0">
-              <a:lnSpc>
-                <a:spcPct val="200000"/>
-              </a:lnSpc>
-              <a:spcBef>
-                <a:spcPts val="0"/>
-              </a:spcBef>
-              <a:spcAft>
-                <a:spcPts val="0"/>
-              </a:spcAft>
-              <a:buNone/>
-            </a:pPr>
-            <a:endParaRPr sz="1700" b="1">
-              <a:solidFill>
-                <a:schemeClr val="dk1"/>
-              </a:solidFill>
-              <a:latin typeface="Comfortaa"/>
-              <a:ea typeface="Comfortaa"/>
-              <a:cs typeface="Comfortaa"/>
-              <a:sym typeface="Comfortaa"/>
-            </a:endParaRPr>
-          </a:p>
-        </p:txBody>
-      </p:sp>
-      <p:sp>
-        <p:nvSpPr>
-          <p:cNvPr id="182" name="Google Shape;182;p21"/>
-          <p:cNvSpPr txBox="1"/>
-          <p:nvPr/>
-        </p:nvSpPr>
-        <p:spPr>
-          <a:xfrm>
-            <a:off x="4555900" y="3313800"/>
-            <a:ext cx="3915900" cy="1073400"/>
-          </a:xfrm>
-          <a:prstGeom prst="rect">
-            <a:avLst/>
-          </a:prstGeom>
-          <a:noFill/>
-          <a:ln>
-            <a:noFill/>
-          </a:ln>
-        </p:spPr>
-        <p:txBody>
-          <a:bodyPr spcFirstLastPara="1" wrap="square" lIns="91425" tIns="91425" rIns="91425" bIns="91425" anchor="t" anchorCtr="0">
-            <a:noAutofit/>
-          </a:bodyPr>
-          <a:lstStyle/>
-          <a:p>
-            <a:pPr marL="0" lvl="0" indent="0" algn="l" rtl="0">
-              <a:lnSpc>
-                <a:spcPct val="200000"/>
-              </a:lnSpc>
-              <a:spcBef>
-                <a:spcPts val="0"/>
-              </a:spcBef>
-              <a:spcAft>
-                <a:spcPts val="0"/>
-              </a:spcAft>
-              <a:buNone/>
-            </a:pPr>
-            <a:r>
-              <a:rPr lang="en" sz="1100" b="1">
-                <a:solidFill>
-                  <a:schemeClr val="dk1"/>
-                </a:solidFill>
-                <a:latin typeface="Comfortaa"/>
-                <a:ea typeface="Comfortaa"/>
-                <a:cs typeface="Comfortaa"/>
-                <a:sym typeface="Comfortaa"/>
-              </a:rPr>
-              <a:t>MiuraSan</a:t>
-            </a:r>
-            <a:endParaRPr sz="1100" b="1">
-              <a:solidFill>
-                <a:schemeClr val="dk1"/>
-              </a:solidFill>
-              <a:latin typeface="Comfortaa"/>
-              <a:ea typeface="Comfortaa"/>
-              <a:cs typeface="Comfortaa"/>
-              <a:sym typeface="Comfortaa"/>
-            </a:endParaRPr>
-          </a:p>
-          <a:p>
-            <a:pPr marL="0" lvl="0" indent="0" algn="l" rtl="0">
-              <a:lnSpc>
-                <a:spcPct val="200000"/>
-              </a:lnSpc>
-              <a:spcBef>
-                <a:spcPts val="0"/>
-              </a:spcBef>
-              <a:spcAft>
-                <a:spcPts val="0"/>
-              </a:spcAft>
-              <a:buNone/>
-            </a:pPr>
-            <a:r>
-              <a:rPr lang="en" sz="1000" b="1">
-                <a:solidFill>
-                  <a:schemeClr val="dk1"/>
-                </a:solidFill>
-                <a:latin typeface="Comfortaa"/>
-                <a:ea typeface="Comfortaa"/>
-                <a:cs typeface="Comfortaa"/>
-                <a:sym typeface="Comfortaa"/>
-              </a:rPr>
-              <a:t>Poder: </a:t>
-            </a:r>
-            <a:r>
-              <a:rPr lang="en" sz="1000">
-                <a:solidFill>
-                  <a:schemeClr val="dk1"/>
-                </a:solidFill>
-                <a:latin typeface="Comfortaa Regular"/>
-                <a:ea typeface="Comfortaa Regular"/>
-                <a:cs typeface="Comfortaa Regular"/>
-                <a:sym typeface="Comfortaa Regular"/>
-              </a:rPr>
-              <a:t>Aptidão intuitiva, </a:t>
-            </a:r>
-            <a:r>
-              <a:rPr lang="en" sz="1000">
-                <a:solidFill>
-                  <a:schemeClr val="dk1"/>
-                </a:solidFill>
-                <a:highlight>
-                  <a:srgbClr val="FFFFFF"/>
-                </a:highlight>
-                <a:latin typeface="Comfortaa Regular"/>
-                <a:ea typeface="Comfortaa Regular"/>
-                <a:cs typeface="Comfortaa Regular"/>
-                <a:sym typeface="Comfortaa Regular"/>
-              </a:rPr>
-              <a:t>Duplicação</a:t>
-            </a:r>
-            <a:endParaRPr sz="1000">
-              <a:solidFill>
-                <a:schemeClr val="dk1"/>
-              </a:solidFill>
-              <a:latin typeface="Comfortaa Regular"/>
-              <a:ea typeface="Comfortaa Regular"/>
-              <a:cs typeface="Comfortaa Regular"/>
-              <a:sym typeface="Comfortaa Regular"/>
-            </a:endParaRPr>
-          </a:p>
-          <a:p>
-            <a:pPr marL="0" lvl="0" indent="0" algn="l" rtl="0">
-              <a:lnSpc>
-                <a:spcPct val="200000"/>
-              </a:lnSpc>
-              <a:spcBef>
-                <a:spcPts val="0"/>
-              </a:spcBef>
-              <a:spcAft>
-                <a:spcPts val="0"/>
-              </a:spcAft>
-              <a:buNone/>
-            </a:pPr>
-            <a:r>
-              <a:rPr lang="en" sz="1000" b="1">
-                <a:solidFill>
-                  <a:schemeClr val="dk1"/>
-                </a:solidFill>
-                <a:latin typeface="Comfortaa"/>
-                <a:ea typeface="Comfortaa"/>
-                <a:cs typeface="Comfortaa"/>
-                <a:sym typeface="Comfortaa"/>
-              </a:rPr>
-              <a:t>Kriptonita: </a:t>
-            </a:r>
-            <a:r>
-              <a:rPr lang="en" sz="1000">
-                <a:solidFill>
-                  <a:schemeClr val="dk1"/>
-                </a:solidFill>
-                <a:latin typeface="Comfortaa Regular"/>
-                <a:ea typeface="Comfortaa Regular"/>
-                <a:cs typeface="Comfortaa Regular"/>
-                <a:sym typeface="Comfortaa Regular"/>
-              </a:rPr>
-              <a:t>Falta de confiança ( minha namorada tbm )</a:t>
-            </a:r>
-            <a:endParaRPr sz="1000">
-              <a:solidFill>
-                <a:schemeClr val="dk1"/>
-              </a:solidFill>
-              <a:latin typeface="Comfortaa Regular"/>
-              <a:ea typeface="Comfortaa Regular"/>
-              <a:cs typeface="Comfortaa Regular"/>
-              <a:sym typeface="Comfortaa Regular"/>
-            </a:endParaRPr>
-          </a:p>
-          <a:p>
-            <a:pPr marL="0" lvl="0" indent="0" algn="l" rtl="0">
-              <a:lnSpc>
-                <a:spcPct val="200000"/>
-              </a:lnSpc>
-              <a:spcBef>
-                <a:spcPts val="0"/>
-              </a:spcBef>
-              <a:spcAft>
-                <a:spcPts val="0"/>
-              </a:spcAft>
-              <a:buNone/>
-            </a:pPr>
-            <a:endParaRPr/>
-          </a:p>
-        </p:txBody>
-      </p:sp>
-      <p:sp>
-        <p:nvSpPr>
-          <p:cNvPr id="183" name="Google Shape;183;p21"/>
-          <p:cNvSpPr txBox="1"/>
-          <p:nvPr/>
-        </p:nvSpPr>
-        <p:spPr>
-          <a:xfrm>
-            <a:off x="8412750" y="4697175"/>
-            <a:ext cx="611100" cy="378300"/>
-          </a:xfrm>
-          <a:prstGeom prst="rect">
-            <a:avLst/>
-          </a:prstGeom>
-          <a:noFill/>
-          <a:ln>
-            <a:noFill/>
-          </a:ln>
-        </p:spPr>
-        <p:txBody>
-          <a:bodyPr spcFirstLastPara="1" wrap="square" lIns="91425" tIns="91425" rIns="91425" bIns="91425" anchor="t" anchorCtr="0">
-            <a:noAutofit/>
-          </a:bodyPr>
-          <a:lstStyle/>
-          <a:p>
-            <a:pPr marL="0" lvl="0" indent="0" algn="r" rtl="0">
-              <a:lnSpc>
-                <a:spcPct val="150000"/>
-              </a:lnSpc>
-              <a:spcBef>
-                <a:spcPts val="0"/>
-              </a:spcBef>
-              <a:spcAft>
-                <a:spcPts val="0"/>
-              </a:spcAft>
-              <a:buNone/>
-            </a:pPr>
-            <a:r>
-              <a:rPr lang="en" sz="1000">
-                <a:solidFill>
-                  <a:schemeClr val="dk1"/>
-                </a:solidFill>
-                <a:latin typeface="Comfortaa Regular"/>
-                <a:ea typeface="Comfortaa Regular"/>
-                <a:cs typeface="Comfortaa Regular"/>
-                <a:sym typeface="Comfortaa Regular"/>
-              </a:rPr>
-              <a:t>10/10</a:t>
             </a:r>
             <a:endParaRPr sz="1000">
               <a:solidFill>

</xml_diff>